<commit_message>
Adding CFG to explain Soot-based static analysis
</commit_message>
<xml_diff>
--- a/figures/bytecode_stream.pptx
+++ b/figures/bytecode_stream.pptx
@@ -5,7 +5,7 @@
     <p:sldMasterId id="2147483648" r:id="rId1"/>
   </p:sldMasterIdLst>
   <p:notesMasterIdLst>
-    <p:notesMasterId r:id="rId8"/>
+    <p:notesMasterId r:id="rId10"/>
   </p:notesMasterIdLst>
   <p:sldIdLst>
     <p:sldId id="256" r:id="rId2"/>
@@ -13,7 +13,9 @@
     <p:sldId id="258" r:id="rId4"/>
     <p:sldId id="259" r:id="rId5"/>
     <p:sldId id="261" r:id="rId6"/>
-    <p:sldId id="260" r:id="rId7"/>
+    <p:sldId id="262" r:id="rId7"/>
+    <p:sldId id="260" r:id="rId8"/>
+    <p:sldId id="263" r:id="rId9"/>
   </p:sldIdLst>
   <p:sldSz cx="12192000" cy="6858000"/>
   <p:notesSz cx="6858000" cy="9144000"/>
@@ -114,7 +116,7 @@
   </p:defaultTextStyle>
   <p:extLst>
     <p:ext uri="{EFAFB233-063F-42B5-8137-9DF3F51BA10A}">
-      <p15:sldGuideLst xmlns="" xmlns:p15="http://schemas.microsoft.com/office/powerpoint/2012/main"/>
+      <p15:sldGuideLst xmlns:p15="http://schemas.microsoft.com/office/powerpoint/2012/main" xmlns=""/>
     </p:ext>
   </p:extLst>
 </p:presentation>
@@ -956,6 +958,90 @@
             <a:fld id="{8212815C-390A-45BC-9DE4-0E6B3A256D4C}" type="slidenum">
               <a:rPr lang="en-US" smtClean="0"/>
               <a:t>6</a:t>
+            </a:fld>
+            <a:endParaRPr lang="en-US"/>
+          </a:p>
+        </p:txBody>
+      </p:sp>
+    </p:spTree>
+    <p:extLst>
+      <p:ext uri="{BB962C8B-B14F-4D97-AF65-F5344CB8AC3E}">
+        <p14:creationId xmlns:p14="http://schemas.microsoft.com/office/powerpoint/2010/main" val="3740496012"/>
+      </p:ext>
+    </p:extLst>
+  </p:cSld>
+  <p:clrMapOvr>
+    <a:masterClrMapping/>
+  </p:clrMapOvr>
+</p:notes>
+</file>
+
+<file path=ppt/notesSlides/notesSlide7.xml><?xml version="1.0" encoding="utf-8"?>
+<p:notes xmlns:a="http://schemas.openxmlformats.org/drawingml/2006/main" xmlns:r="http://schemas.openxmlformats.org/officeDocument/2006/relationships" xmlns:p="http://schemas.openxmlformats.org/presentationml/2006/main">
+  <p:cSld>
+    <p:spTree>
+      <p:nvGrpSpPr>
+        <p:cNvPr id="1" name=""/>
+        <p:cNvGrpSpPr/>
+        <p:nvPr/>
+      </p:nvGrpSpPr>
+      <p:grpSpPr>
+        <a:xfrm>
+          <a:off x="0" y="0"/>
+          <a:ext cx="0" cy="0"/>
+          <a:chOff x="0" y="0"/>
+          <a:chExt cx="0" cy="0"/>
+        </a:xfrm>
+      </p:grpSpPr>
+      <p:sp>
+        <p:nvSpPr>
+          <p:cNvPr id="2" name="Slide Image Placeholder 1"/>
+          <p:cNvSpPr>
+            <a:spLocks noGrp="1" noRot="1" noChangeAspect="1"/>
+          </p:cNvSpPr>
+          <p:nvPr>
+            <p:ph type="sldImg"/>
+          </p:nvPr>
+        </p:nvSpPr>
+        <p:spPr/>
+      </p:sp>
+      <p:sp>
+        <p:nvSpPr>
+          <p:cNvPr id="3" name="Notes Placeholder 2"/>
+          <p:cNvSpPr>
+            <a:spLocks noGrp="1"/>
+          </p:cNvSpPr>
+          <p:nvPr>
+            <p:ph type="body" idx="1"/>
+          </p:nvPr>
+        </p:nvSpPr>
+        <p:spPr/>
+        <p:txBody>
+          <a:bodyPr/>
+          <a:lstStyle/>
+          <a:p>
+            <a:endParaRPr lang="en-US"/>
+          </a:p>
+        </p:txBody>
+      </p:sp>
+      <p:sp>
+        <p:nvSpPr>
+          <p:cNvPr id="4" name="Slide Number Placeholder 3"/>
+          <p:cNvSpPr>
+            <a:spLocks noGrp="1"/>
+          </p:cNvSpPr>
+          <p:nvPr>
+            <p:ph type="sldNum" sz="quarter" idx="10"/>
+          </p:nvPr>
+        </p:nvSpPr>
+        <p:spPr/>
+        <p:txBody>
+          <a:bodyPr/>
+          <a:lstStyle/>
+          <a:p>
+            <a:fld id="{8212815C-390A-45BC-9DE4-0E6B3A256D4C}" type="slidenum">
+              <a:rPr lang="en-US" smtClean="0"/>
+              <a:t>7</a:t>
             </a:fld>
             <a:endParaRPr lang="en-US"/>
           </a:p>
@@ -8346,11 +8432,7 @@
             <a:p>
               <a:r>
                 <a:rPr lang="en-US" sz="1400" dirty="0" smtClean="0"/>
-                <a:t>Add </a:t>
-              </a:r>
-              <a:r>
-                <a:rPr lang="en-US" sz="1400" dirty="0" smtClean="0"/>
-                <a:t>SPF </a:t>
+                <a:t>Add SPF </a:t>
               </a:r>
               <a:r>
                 <a:rPr lang="en-US" sz="1400" dirty="0" err="1" smtClean="0"/>
@@ -8358,11 +8440,7 @@
               </a:r>
               <a:r>
                 <a:rPr lang="en-US" sz="1400" dirty="0" smtClean="0"/>
-                <a:t> </a:t>
-              </a:r>
-              <a:r>
-                <a:rPr lang="en-US" sz="1400" dirty="0" smtClean="0"/>
-                <a:t>for exit points. If SAT, update PC and symbolic store and continue symbolic execution </a:t>
+                <a:t> for exit points. If SAT, update PC and symbolic store and continue symbolic execution </a:t>
               </a:r>
               <a:endParaRPr lang="en-US" sz="1400" dirty="0"/>
             </a:p>
@@ -8922,6 +9000,195 @@
           </p:style>
         </p:cxnSp>
       </p:grpSp>
+      <p:sp>
+        <p:nvSpPr>
+          <p:cNvPr id="20" name="Oval 19"/>
+          <p:cNvSpPr/>
+          <p:nvPr/>
+        </p:nvSpPr>
+        <p:spPr>
+          <a:xfrm>
+            <a:off x="8314266" y="83134"/>
+            <a:ext cx="3369734" cy="1567868"/>
+          </a:xfrm>
+          <a:prstGeom prst="ellipse">
+            <a:avLst/>
+          </a:prstGeom>
+          <a:noFill/>
+          <a:ln>
+            <a:solidFill>
+              <a:schemeClr val="tx1"/>
+            </a:solidFill>
+          </a:ln>
+        </p:spPr>
+        <p:style>
+          <a:lnRef idx="1">
+            <a:schemeClr val="accent1"/>
+          </a:lnRef>
+          <a:fillRef idx="3">
+            <a:schemeClr val="accent1"/>
+          </a:fillRef>
+          <a:effectRef idx="2">
+            <a:schemeClr val="accent1"/>
+          </a:effectRef>
+          <a:fontRef idx="minor">
+            <a:schemeClr val="lt1"/>
+          </a:fontRef>
+        </p:style>
+        <p:txBody>
+          <a:bodyPr wrap="none" rtlCol="0" anchor="ctr">
+            <a:noAutofit/>
+          </a:bodyPr>
+          <a:lstStyle/>
+          <a:p>
+            <a:pPr lvl="0" algn="ctr"/>
+            <a:endParaRPr lang="de-DE" dirty="0" smtClean="0">
+              <a:solidFill>
+                <a:prstClr val="black"/>
+              </a:solidFill>
+              <a:latin typeface="Consolas"/>
+              <a:cs typeface="Consolas"/>
+            </a:endParaRPr>
+          </a:p>
+          <a:p>
+            <a:pPr lvl="0" algn="ctr"/>
+            <a:r>
+              <a:rPr lang="de-DE" dirty="0" smtClean="0">
+                <a:solidFill>
+                  <a:prstClr val="black"/>
+                </a:solidFill>
+                <a:latin typeface="Consolas"/>
+                <a:cs typeface="Consolas"/>
+              </a:rPr>
+              <a:t>14</a:t>
+            </a:r>
+            <a:r>
+              <a:rPr lang="de-DE" dirty="0">
+                <a:solidFill>
+                  <a:prstClr val="black"/>
+                </a:solidFill>
+                <a:latin typeface="Consolas"/>
+                <a:cs typeface="Consolas"/>
+              </a:rPr>
+              <a:t>: aload_1</a:t>
+            </a:r>
+          </a:p>
+          <a:p>
+            <a:pPr lvl="0" algn="ctr"/>
+            <a:r>
+              <a:rPr lang="de-DE" dirty="0">
+                <a:solidFill>
+                  <a:prstClr val="black"/>
+                </a:solidFill>
+                <a:latin typeface="Consolas"/>
+                <a:cs typeface="Consolas"/>
+              </a:rPr>
+              <a:t>15: </a:t>
+            </a:r>
+            <a:r>
+              <a:rPr lang="de-DE" dirty="0" err="1" smtClean="0">
+                <a:solidFill>
+                  <a:prstClr val="black"/>
+                </a:solidFill>
+                <a:latin typeface="Consolas"/>
+                <a:cs typeface="Consolas"/>
+              </a:rPr>
+              <a:t>iload</a:t>
+            </a:r>
+            <a:r>
+              <a:rPr lang="de-DE" dirty="0" smtClean="0">
+                <a:solidFill>
+                  <a:prstClr val="black"/>
+                </a:solidFill>
+                <a:latin typeface="Consolas"/>
+                <a:cs typeface="Consolas"/>
+              </a:rPr>
+              <a:t> 4</a:t>
+            </a:r>
+            <a:endParaRPr lang="de-DE" dirty="0">
+              <a:solidFill>
+                <a:prstClr val="black"/>
+              </a:solidFill>
+              <a:latin typeface="Consolas"/>
+              <a:cs typeface="Consolas"/>
+            </a:endParaRPr>
+          </a:p>
+          <a:p>
+            <a:pPr lvl="0" algn="ctr"/>
+            <a:r>
+              <a:rPr lang="de-DE" dirty="0">
+                <a:solidFill>
+                  <a:prstClr val="black"/>
+                </a:solidFill>
+                <a:latin typeface="Consolas"/>
+                <a:cs typeface="Consolas"/>
+              </a:rPr>
+              <a:t>17: </a:t>
+            </a:r>
+            <a:r>
+              <a:rPr lang="de-DE" dirty="0" err="1">
+                <a:solidFill>
+                  <a:prstClr val="black"/>
+                </a:solidFill>
+                <a:latin typeface="Consolas"/>
+                <a:cs typeface="Consolas"/>
+              </a:rPr>
+              <a:t>iaload</a:t>
+            </a:r>
+            <a:endParaRPr lang="de-DE" dirty="0">
+              <a:solidFill>
+                <a:prstClr val="black"/>
+              </a:solidFill>
+              <a:latin typeface="Consolas"/>
+              <a:cs typeface="Consolas"/>
+            </a:endParaRPr>
+          </a:p>
+          <a:p>
+            <a:pPr lvl="0" algn="ctr"/>
+            <a:r>
+              <a:rPr lang="de-DE" dirty="0">
+                <a:solidFill>
+                  <a:prstClr val="black"/>
+                </a:solidFill>
+                <a:latin typeface="Consolas"/>
+                <a:cs typeface="Consolas"/>
+              </a:rPr>
+              <a:t>18: </a:t>
+            </a:r>
+            <a:r>
+              <a:rPr lang="de-DE" dirty="0" err="1" smtClean="0">
+                <a:solidFill>
+                  <a:prstClr val="black"/>
+                </a:solidFill>
+                <a:latin typeface="Consolas"/>
+                <a:cs typeface="Consolas"/>
+              </a:rPr>
+              <a:t>ifge</a:t>
+            </a:r>
+            <a:r>
+              <a:rPr lang="de-DE" dirty="0" smtClean="0">
+                <a:solidFill>
+                  <a:prstClr val="black"/>
+                </a:solidFill>
+                <a:latin typeface="Consolas"/>
+                <a:cs typeface="Consolas"/>
+              </a:rPr>
+              <a:t> 27</a:t>
+            </a:r>
+            <a:endParaRPr lang="de-DE" dirty="0">
+              <a:solidFill>
+                <a:prstClr val="black"/>
+              </a:solidFill>
+              <a:latin typeface="Consolas"/>
+              <a:cs typeface="Consolas"/>
+            </a:endParaRPr>
+          </a:p>
+          <a:p>
+            <a:pPr algn="ctr"/>
+            <a:endParaRPr lang="en-US" dirty="0"/>
+          </a:p>
+        </p:txBody>
+      </p:sp>
     </p:spTree>
     <p:extLst>
       <p:ext uri="{BB962C8B-B14F-4D97-AF65-F5344CB8AC3E}">
@@ -8943,6 +9210,562 @@
 </file>
 
 <file path=ppt/slides/slide6.xml><?xml version="1.0" encoding="utf-8"?>
+<p:sld xmlns:a="http://schemas.openxmlformats.org/drawingml/2006/main" xmlns:r="http://schemas.openxmlformats.org/officeDocument/2006/relationships" xmlns:p="http://schemas.openxmlformats.org/presentationml/2006/main">
+  <p:cSld>
+    <p:spTree>
+      <p:nvGrpSpPr>
+        <p:cNvPr id="1" name=""/>
+        <p:cNvGrpSpPr/>
+        <p:nvPr/>
+      </p:nvGrpSpPr>
+      <p:grpSpPr>
+        <a:xfrm>
+          <a:off x="0" y="0"/>
+          <a:ext cx="0" cy="0"/>
+          <a:chOff x="0" y="0"/>
+          <a:chExt cx="0" cy="0"/>
+        </a:xfrm>
+      </p:grpSpPr>
+      <p:sp>
+        <p:nvSpPr>
+          <p:cNvPr id="2" name="Rectangle 1"/>
+          <p:cNvSpPr/>
+          <p:nvPr/>
+        </p:nvSpPr>
+        <p:spPr>
+          <a:xfrm>
+            <a:off x="72253" y="838275"/>
+            <a:ext cx="3438261" cy="4770537"/>
+          </a:xfrm>
+          <a:prstGeom prst="rect">
+            <a:avLst/>
+          </a:prstGeom>
+        </p:spPr>
+        <p:txBody>
+          <a:bodyPr wrap="square">
+            <a:spAutoFit/>
+          </a:bodyPr>
+          <a:lstStyle/>
+          <a:p>
+            <a:r>
+              <a:rPr lang="en-US" sz="1600" dirty="0" smtClean="0">
+                <a:latin typeface="Consolas" panose="020B0609020204030204" pitchFamily="49" charset="0"/>
+              </a:rPr>
+              <a:t>…</a:t>
+            </a:r>
+          </a:p>
+          <a:p>
+            <a:r>
+              <a:rPr lang="en-US" sz="1600" dirty="0">
+                <a:latin typeface="Consolas" panose="020B0609020204030204" pitchFamily="49" charset="0"/>
+              </a:rPr>
+              <a:t>11: </a:t>
+            </a:r>
+            <a:r>
+              <a:rPr lang="en-US" sz="1600" dirty="0" err="1">
+                <a:latin typeface="Consolas" panose="020B0609020204030204" pitchFamily="49" charset="0"/>
+              </a:rPr>
+              <a:t>if_icmpge</a:t>
+            </a:r>
+            <a:r>
+              <a:rPr lang="en-US" sz="1600" dirty="0">
+                <a:latin typeface="Consolas" panose="020B0609020204030204" pitchFamily="49" charset="0"/>
+              </a:rPr>
+              <a:t>     47</a:t>
+            </a:r>
+          </a:p>
+          <a:p>
+            <a:r>
+              <a:rPr lang="en-US" sz="1600" dirty="0">
+                <a:latin typeface="Consolas" panose="020B0609020204030204" pitchFamily="49" charset="0"/>
+              </a:rPr>
+              <a:t>14: aload_1</a:t>
+            </a:r>
+          </a:p>
+          <a:p>
+            <a:r>
+              <a:rPr lang="en-US" sz="1600" dirty="0">
+                <a:latin typeface="Consolas" panose="020B0609020204030204" pitchFamily="49" charset="0"/>
+              </a:rPr>
+              <a:t>15: </a:t>
+            </a:r>
+            <a:r>
+              <a:rPr lang="en-US" sz="1600" dirty="0" err="1">
+                <a:latin typeface="Consolas" panose="020B0609020204030204" pitchFamily="49" charset="0"/>
+              </a:rPr>
+              <a:t>iload</a:t>
+            </a:r>
+            <a:r>
+              <a:rPr lang="en-US" sz="1600" dirty="0">
+                <a:latin typeface="Consolas" panose="020B0609020204030204" pitchFamily="49" charset="0"/>
+              </a:rPr>
+              <a:t>         4</a:t>
+            </a:r>
+          </a:p>
+          <a:p>
+            <a:r>
+              <a:rPr lang="en-US" sz="1600" dirty="0">
+                <a:solidFill>
+                  <a:schemeClr val="bg2">
+                    <a:lumMod val="75000"/>
+                  </a:schemeClr>
+                </a:solidFill>
+                <a:latin typeface="Consolas" panose="020B0609020204030204" pitchFamily="49" charset="0"/>
+              </a:rPr>
+              <a:t>17: </a:t>
+            </a:r>
+            <a:r>
+              <a:rPr lang="en-US" sz="1600" dirty="0" err="1">
+                <a:solidFill>
+                  <a:schemeClr val="bg2">
+                    <a:lumMod val="75000"/>
+                  </a:schemeClr>
+                </a:solidFill>
+                <a:latin typeface="Consolas" panose="020B0609020204030204" pitchFamily="49" charset="0"/>
+              </a:rPr>
+              <a:t>iaload</a:t>
+            </a:r>
+            <a:endParaRPr lang="en-US" sz="1600" dirty="0">
+              <a:solidFill>
+                <a:schemeClr val="bg2">
+                  <a:lumMod val="75000"/>
+                </a:schemeClr>
+              </a:solidFill>
+              <a:latin typeface="Consolas" panose="020B0609020204030204" pitchFamily="49" charset="0"/>
+            </a:endParaRPr>
+          </a:p>
+          <a:p>
+            <a:r>
+              <a:rPr lang="en-US" sz="1600" dirty="0">
+                <a:solidFill>
+                  <a:schemeClr val="bg2">
+                    <a:lumMod val="75000"/>
+                  </a:schemeClr>
+                </a:solidFill>
+                <a:latin typeface="Consolas" panose="020B0609020204030204" pitchFamily="49" charset="0"/>
+              </a:rPr>
+              <a:t>18: </a:t>
+            </a:r>
+            <a:r>
+              <a:rPr lang="en-US" sz="1600" dirty="0" err="1">
+                <a:solidFill>
+                  <a:schemeClr val="bg2">
+                    <a:lumMod val="75000"/>
+                  </a:schemeClr>
+                </a:solidFill>
+                <a:latin typeface="Consolas" panose="020B0609020204030204" pitchFamily="49" charset="0"/>
+              </a:rPr>
+              <a:t>ifge</a:t>
+            </a:r>
+            <a:r>
+              <a:rPr lang="en-US" sz="1600" dirty="0">
+                <a:solidFill>
+                  <a:schemeClr val="bg2">
+                    <a:lumMod val="75000"/>
+                  </a:schemeClr>
+                </a:solidFill>
+                <a:latin typeface="Consolas" panose="020B0609020204030204" pitchFamily="49" charset="0"/>
+              </a:rPr>
+              <a:t>          27</a:t>
+            </a:r>
+          </a:p>
+          <a:p>
+            <a:r>
+              <a:rPr lang="en-US" sz="1600" dirty="0">
+                <a:solidFill>
+                  <a:schemeClr val="bg2">
+                    <a:lumMod val="75000"/>
+                  </a:schemeClr>
+                </a:solidFill>
+                <a:latin typeface="Consolas" panose="020B0609020204030204" pitchFamily="49" charset="0"/>
+              </a:rPr>
+              <a:t>21: </a:t>
+            </a:r>
+            <a:r>
+              <a:rPr lang="en-US" sz="1600" dirty="0" err="1">
+                <a:solidFill>
+                  <a:schemeClr val="bg2">
+                    <a:lumMod val="75000"/>
+                  </a:schemeClr>
+                </a:solidFill>
+                <a:latin typeface="Consolas" panose="020B0609020204030204" pitchFamily="49" charset="0"/>
+              </a:rPr>
+              <a:t>iinc</a:t>
+            </a:r>
+            <a:r>
+              <a:rPr lang="en-US" sz="1600" dirty="0">
+                <a:solidFill>
+                  <a:schemeClr val="bg2">
+                    <a:lumMod val="75000"/>
+                  </a:schemeClr>
+                </a:solidFill>
+                <a:latin typeface="Consolas" panose="020B0609020204030204" pitchFamily="49" charset="0"/>
+              </a:rPr>
+              <a:t>          2, -1</a:t>
+            </a:r>
+          </a:p>
+          <a:p>
+            <a:r>
+              <a:rPr lang="en-US" sz="1600" dirty="0">
+                <a:solidFill>
+                  <a:schemeClr val="bg2">
+                    <a:lumMod val="75000"/>
+                  </a:schemeClr>
+                </a:solidFill>
+                <a:latin typeface="Consolas" panose="020B0609020204030204" pitchFamily="49" charset="0"/>
+              </a:rPr>
+              <a:t>24: </a:t>
+            </a:r>
+            <a:r>
+              <a:rPr lang="en-US" sz="1600" dirty="0" err="1">
+                <a:solidFill>
+                  <a:schemeClr val="bg2">
+                    <a:lumMod val="75000"/>
+                  </a:schemeClr>
+                </a:solidFill>
+                <a:latin typeface="Consolas" panose="020B0609020204030204" pitchFamily="49" charset="0"/>
+              </a:rPr>
+              <a:t>goto</a:t>
+            </a:r>
+            <a:r>
+              <a:rPr lang="en-US" sz="1600" dirty="0">
+                <a:solidFill>
+                  <a:schemeClr val="bg2">
+                    <a:lumMod val="75000"/>
+                  </a:schemeClr>
+                </a:solidFill>
+                <a:latin typeface="Consolas" panose="020B0609020204030204" pitchFamily="49" charset="0"/>
+              </a:rPr>
+              <a:t>          41</a:t>
+            </a:r>
+          </a:p>
+          <a:p>
+            <a:r>
+              <a:rPr lang="en-US" sz="1600" dirty="0">
+                <a:solidFill>
+                  <a:schemeClr val="bg2">
+                    <a:lumMod val="75000"/>
+                  </a:schemeClr>
+                </a:solidFill>
+                <a:latin typeface="Consolas" panose="020B0609020204030204" pitchFamily="49" charset="0"/>
+              </a:rPr>
+              <a:t>27: aload_1</a:t>
+            </a:r>
+          </a:p>
+          <a:p>
+            <a:r>
+              <a:rPr lang="en-US" sz="1600" dirty="0">
+                <a:solidFill>
+                  <a:schemeClr val="bg2">
+                    <a:lumMod val="75000"/>
+                  </a:schemeClr>
+                </a:solidFill>
+                <a:latin typeface="Consolas" panose="020B0609020204030204" pitchFamily="49" charset="0"/>
+              </a:rPr>
+              <a:t>28: </a:t>
+            </a:r>
+            <a:r>
+              <a:rPr lang="en-US" sz="1600" dirty="0" err="1">
+                <a:solidFill>
+                  <a:schemeClr val="bg2">
+                    <a:lumMod val="75000"/>
+                  </a:schemeClr>
+                </a:solidFill>
+                <a:latin typeface="Consolas" panose="020B0609020204030204" pitchFamily="49" charset="0"/>
+              </a:rPr>
+              <a:t>iload</a:t>
+            </a:r>
+            <a:r>
+              <a:rPr lang="en-US" sz="1600" dirty="0">
+                <a:solidFill>
+                  <a:schemeClr val="bg2">
+                    <a:lumMod val="75000"/>
+                  </a:schemeClr>
+                </a:solidFill>
+                <a:latin typeface="Consolas" panose="020B0609020204030204" pitchFamily="49" charset="0"/>
+              </a:rPr>
+              <a:t>         4</a:t>
+            </a:r>
+          </a:p>
+          <a:p>
+            <a:r>
+              <a:rPr lang="en-US" sz="1600" dirty="0">
+                <a:solidFill>
+                  <a:schemeClr val="bg2">
+                    <a:lumMod val="75000"/>
+                  </a:schemeClr>
+                </a:solidFill>
+                <a:latin typeface="Consolas" panose="020B0609020204030204" pitchFamily="49" charset="0"/>
+              </a:rPr>
+              <a:t>30: </a:t>
+            </a:r>
+            <a:r>
+              <a:rPr lang="en-US" sz="1600" dirty="0" err="1">
+                <a:solidFill>
+                  <a:schemeClr val="bg2">
+                    <a:lumMod val="75000"/>
+                  </a:schemeClr>
+                </a:solidFill>
+                <a:latin typeface="Consolas" panose="020B0609020204030204" pitchFamily="49" charset="0"/>
+              </a:rPr>
+              <a:t>iaload</a:t>
+            </a:r>
+            <a:endParaRPr lang="en-US" sz="1600" dirty="0">
+              <a:solidFill>
+                <a:schemeClr val="bg2">
+                  <a:lumMod val="75000"/>
+                </a:schemeClr>
+              </a:solidFill>
+              <a:latin typeface="Consolas" panose="020B0609020204030204" pitchFamily="49" charset="0"/>
+            </a:endParaRPr>
+          </a:p>
+          <a:p>
+            <a:r>
+              <a:rPr lang="en-US" sz="1600" dirty="0">
+                <a:solidFill>
+                  <a:schemeClr val="bg2">
+                    <a:lumMod val="75000"/>
+                  </a:schemeClr>
+                </a:solidFill>
+                <a:latin typeface="Consolas" panose="020B0609020204030204" pitchFamily="49" charset="0"/>
+              </a:rPr>
+              <a:t>31: </a:t>
+            </a:r>
+            <a:r>
+              <a:rPr lang="en-US" sz="1600" dirty="0" err="1">
+                <a:solidFill>
+                  <a:schemeClr val="bg2">
+                    <a:lumMod val="75000"/>
+                  </a:schemeClr>
+                </a:solidFill>
+                <a:latin typeface="Consolas" panose="020B0609020204030204" pitchFamily="49" charset="0"/>
+              </a:rPr>
+              <a:t>ifle</a:t>
+            </a:r>
+            <a:r>
+              <a:rPr lang="en-US" sz="1600" dirty="0">
+                <a:solidFill>
+                  <a:schemeClr val="bg2">
+                    <a:lumMod val="75000"/>
+                  </a:schemeClr>
+                </a:solidFill>
+                <a:latin typeface="Consolas" panose="020B0609020204030204" pitchFamily="49" charset="0"/>
+              </a:rPr>
+              <a:t>          40</a:t>
+            </a:r>
+          </a:p>
+          <a:p>
+            <a:r>
+              <a:rPr lang="en-US" sz="1600" dirty="0">
+                <a:solidFill>
+                  <a:schemeClr val="bg2">
+                    <a:lumMod val="75000"/>
+                  </a:schemeClr>
+                </a:solidFill>
+                <a:latin typeface="Consolas" panose="020B0609020204030204" pitchFamily="49" charset="0"/>
+              </a:rPr>
+              <a:t>34: </a:t>
+            </a:r>
+            <a:r>
+              <a:rPr lang="en-US" sz="1600" dirty="0" err="1">
+                <a:solidFill>
+                  <a:schemeClr val="bg2">
+                    <a:lumMod val="75000"/>
+                  </a:schemeClr>
+                </a:solidFill>
+                <a:latin typeface="Consolas" panose="020B0609020204030204" pitchFamily="49" charset="0"/>
+              </a:rPr>
+              <a:t>iinc</a:t>
+            </a:r>
+            <a:r>
+              <a:rPr lang="en-US" sz="1600" dirty="0">
+                <a:solidFill>
+                  <a:schemeClr val="bg2">
+                    <a:lumMod val="75000"/>
+                  </a:schemeClr>
+                </a:solidFill>
+                <a:latin typeface="Consolas" panose="020B0609020204030204" pitchFamily="49" charset="0"/>
+              </a:rPr>
+              <a:t>          2, 1</a:t>
+            </a:r>
+          </a:p>
+          <a:p>
+            <a:r>
+              <a:rPr lang="en-US" sz="1600" dirty="0">
+                <a:solidFill>
+                  <a:schemeClr val="bg2">
+                    <a:lumMod val="75000"/>
+                  </a:schemeClr>
+                </a:solidFill>
+                <a:latin typeface="Consolas" panose="020B0609020204030204" pitchFamily="49" charset="0"/>
+              </a:rPr>
+              <a:t>37: </a:t>
+            </a:r>
+            <a:r>
+              <a:rPr lang="en-US" sz="1600" dirty="0" err="1">
+                <a:solidFill>
+                  <a:schemeClr val="bg2">
+                    <a:lumMod val="75000"/>
+                  </a:schemeClr>
+                </a:solidFill>
+                <a:latin typeface="Consolas" panose="020B0609020204030204" pitchFamily="49" charset="0"/>
+              </a:rPr>
+              <a:t>goto</a:t>
+            </a:r>
+            <a:r>
+              <a:rPr lang="en-US" sz="1600" dirty="0">
+                <a:solidFill>
+                  <a:schemeClr val="bg2">
+                    <a:lumMod val="75000"/>
+                  </a:schemeClr>
+                </a:solidFill>
+                <a:latin typeface="Consolas" panose="020B0609020204030204" pitchFamily="49" charset="0"/>
+              </a:rPr>
+              <a:t>          41</a:t>
+            </a:r>
+          </a:p>
+          <a:p>
+            <a:r>
+              <a:rPr lang="en-US" sz="1600" dirty="0">
+                <a:solidFill>
+                  <a:srgbClr val="00B050"/>
+                </a:solidFill>
+                <a:latin typeface="Consolas" panose="020B0609020204030204" pitchFamily="49" charset="0"/>
+              </a:rPr>
+              <a:t>40: return</a:t>
+            </a:r>
+          </a:p>
+          <a:p>
+            <a:r>
+              <a:rPr lang="en-US" sz="1600" dirty="0">
+                <a:solidFill>
+                  <a:srgbClr val="00B050"/>
+                </a:solidFill>
+                <a:latin typeface="Consolas" panose="020B0609020204030204" pitchFamily="49" charset="0"/>
+              </a:rPr>
+              <a:t>41: </a:t>
+            </a:r>
+            <a:r>
+              <a:rPr lang="en-US" sz="1600" dirty="0" err="1">
+                <a:solidFill>
+                  <a:srgbClr val="00B050"/>
+                </a:solidFill>
+                <a:latin typeface="Consolas" panose="020B0609020204030204" pitchFamily="49" charset="0"/>
+              </a:rPr>
+              <a:t>iinc</a:t>
+            </a:r>
+            <a:r>
+              <a:rPr lang="en-US" sz="1600" dirty="0">
+                <a:solidFill>
+                  <a:srgbClr val="00B050"/>
+                </a:solidFill>
+                <a:latin typeface="Consolas" panose="020B0609020204030204" pitchFamily="49" charset="0"/>
+              </a:rPr>
+              <a:t>          4, 1</a:t>
+            </a:r>
+          </a:p>
+          <a:p>
+            <a:r>
+              <a:rPr lang="en-US" sz="1600" dirty="0">
+                <a:latin typeface="Consolas" panose="020B0609020204030204" pitchFamily="49" charset="0"/>
+              </a:rPr>
+              <a:t>44: </a:t>
+            </a:r>
+            <a:r>
+              <a:rPr lang="en-US" sz="1600" dirty="0" err="1">
+                <a:latin typeface="Consolas" panose="020B0609020204030204" pitchFamily="49" charset="0"/>
+              </a:rPr>
+              <a:t>goto</a:t>
+            </a:r>
+            <a:r>
+              <a:rPr lang="en-US" sz="1600" dirty="0">
+                <a:latin typeface="Consolas" panose="020B0609020204030204" pitchFamily="49" charset="0"/>
+              </a:rPr>
+              <a:t>          8</a:t>
+            </a:r>
+          </a:p>
+          <a:p>
+            <a:r>
+              <a:rPr lang="en-US" sz="1600" dirty="0" smtClean="0">
+                <a:latin typeface="Consolas" panose="020B0609020204030204" pitchFamily="49" charset="0"/>
+              </a:rPr>
+              <a:t>…</a:t>
+            </a:r>
+          </a:p>
+          <a:p>
+            <a:endParaRPr lang="en-US" sz="1600" dirty="0" smtClean="0">
+              <a:latin typeface="Consolas" panose="020B0609020204030204" pitchFamily="49" charset="0"/>
+            </a:endParaRPr>
+          </a:p>
+        </p:txBody>
+      </p:sp>
+      <p:sp>
+        <p:nvSpPr>
+          <p:cNvPr id="5" name="TextBox 4"/>
+          <p:cNvSpPr txBox="1"/>
+          <p:nvPr/>
+        </p:nvSpPr>
+        <p:spPr>
+          <a:xfrm>
+            <a:off x="20789" y="131571"/>
+            <a:ext cx="2667130" cy="646331"/>
+          </a:xfrm>
+          <a:prstGeom prst="rect">
+            <a:avLst/>
+          </a:prstGeom>
+          <a:noFill/>
+        </p:spPr>
+        <p:txBody>
+          <a:bodyPr wrap="square" rtlCol="0">
+            <a:spAutoFit/>
+          </a:bodyPr>
+          <a:lstStyle/>
+          <a:p>
+            <a:pPr algn="ctr"/>
+            <a:r>
+              <a:rPr lang="en-US" dirty="0" smtClean="0"/>
+              <a:t>SPF: </a:t>
+            </a:r>
+            <a:r>
+              <a:rPr lang="en-US" dirty="0" err="1" smtClean="0"/>
+              <a:t>SymbolicListener</a:t>
+            </a:r>
+            <a:r>
+              <a:rPr lang="en-US" dirty="0" smtClean="0"/>
+              <a:t> </a:t>
+            </a:r>
+          </a:p>
+          <a:p>
+            <a:pPr algn="ctr"/>
+            <a:r>
+              <a:rPr lang="en-US" dirty="0" smtClean="0"/>
+              <a:t>Interpreting bytecode</a:t>
+            </a:r>
+            <a:endParaRPr lang="en-US" dirty="0"/>
+          </a:p>
+        </p:txBody>
+      </p:sp>
+    </p:spTree>
+    <p:extLst>
+      <p:ext uri="{BB962C8B-B14F-4D97-AF65-F5344CB8AC3E}">
+        <p14:creationId xmlns:p14="http://schemas.microsoft.com/office/powerpoint/2010/main" val="1416380955"/>
+      </p:ext>
+    </p:extLst>
+  </p:cSld>
+  <p:clrMapOvr>
+    <a:masterClrMapping/>
+  </p:clrMapOvr>
+  <p:timing>
+    <p:tnLst>
+      <p:par>
+        <p:cTn xmlns:p14="http://schemas.microsoft.com/office/powerpoint/2010/main" id="1" dur="indefinite" restart="never" nodeType="tmRoot"/>
+      </p:par>
+    </p:tnLst>
+  </p:timing>
+</p:sld>
+</file>
+
+<file path=ppt/slides/slide7.xml><?xml version="1.0" encoding="utf-8"?>
 <p:sld xmlns:a="http://schemas.openxmlformats.org/drawingml/2006/main" xmlns:r="http://schemas.openxmlformats.org/officeDocument/2006/relationships" xmlns:p="http://schemas.openxmlformats.org/presentationml/2006/main">
   <p:cSld>
     <p:spTree>
@@ -10527,6 +11350,1256 @@
       </p:par>
     </p:tnLst>
   </p:timing>
+</p:sld>
+</file>
+
+<file path=ppt/slides/slide8.xml><?xml version="1.0" encoding="utf-8"?>
+<p:sld xmlns:a="http://schemas.openxmlformats.org/drawingml/2006/main" xmlns:r="http://schemas.openxmlformats.org/officeDocument/2006/relationships" xmlns:p="http://schemas.openxmlformats.org/presentationml/2006/main">
+  <p:cSld>
+    <p:spTree>
+      <p:nvGrpSpPr>
+        <p:cNvPr id="1" name=""/>
+        <p:cNvGrpSpPr/>
+        <p:nvPr/>
+      </p:nvGrpSpPr>
+      <p:grpSpPr>
+        <a:xfrm>
+          <a:off x="0" y="0"/>
+          <a:ext cx="0" cy="0"/>
+          <a:chOff x="0" y="0"/>
+          <a:chExt cx="0" cy="0"/>
+        </a:xfrm>
+      </p:grpSpPr>
+      <p:grpSp>
+        <p:nvGrpSpPr>
+          <p:cNvPr id="17" name="Group 16"/>
+          <p:cNvGrpSpPr/>
+          <p:nvPr/>
+        </p:nvGrpSpPr>
+        <p:grpSpPr>
+          <a:xfrm>
+            <a:off x="1058332" y="125469"/>
+            <a:ext cx="10244667" cy="6495459"/>
+            <a:chOff x="1058332" y="125469"/>
+            <a:chExt cx="10244667" cy="6495459"/>
+          </a:xfrm>
+        </p:grpSpPr>
+        <p:sp>
+          <p:nvSpPr>
+            <p:cNvPr id="4" name="Oval 3"/>
+            <p:cNvSpPr/>
+            <p:nvPr/>
+          </p:nvSpPr>
+          <p:spPr>
+            <a:xfrm>
+              <a:off x="3581398" y="125469"/>
+              <a:ext cx="3369734" cy="1432397"/>
+            </a:xfrm>
+            <a:prstGeom prst="ellipse">
+              <a:avLst/>
+            </a:prstGeom>
+            <a:noFill/>
+            <a:ln>
+              <a:solidFill>
+                <a:schemeClr val="tx1"/>
+              </a:solidFill>
+            </a:ln>
+          </p:spPr>
+          <p:style>
+            <a:lnRef idx="1">
+              <a:schemeClr val="accent1"/>
+            </a:lnRef>
+            <a:fillRef idx="3">
+              <a:schemeClr val="accent1"/>
+            </a:fillRef>
+            <a:effectRef idx="2">
+              <a:schemeClr val="accent1"/>
+            </a:effectRef>
+            <a:fontRef idx="minor">
+              <a:schemeClr val="lt1"/>
+            </a:fontRef>
+          </p:style>
+          <p:txBody>
+            <a:bodyPr wrap="none" rtlCol="0" anchor="ctr">
+              <a:noAutofit/>
+            </a:bodyPr>
+            <a:lstStyle/>
+            <a:p>
+              <a:pPr lvl="0" algn="ctr"/>
+              <a:endParaRPr lang="de-DE" dirty="0" smtClean="0">
+                <a:solidFill>
+                  <a:prstClr val="black"/>
+                </a:solidFill>
+                <a:latin typeface="Consolas"/>
+                <a:cs typeface="Consolas"/>
+              </a:endParaRPr>
+            </a:p>
+            <a:p>
+              <a:pPr lvl="0" algn="ctr"/>
+              <a:r>
+                <a:rPr lang="de-DE" dirty="0" smtClean="0">
+                  <a:solidFill>
+                    <a:prstClr val="black"/>
+                  </a:solidFill>
+                  <a:latin typeface="Consolas"/>
+                  <a:cs typeface="Consolas"/>
+                </a:rPr>
+                <a:t>(1)</a:t>
+              </a:r>
+            </a:p>
+            <a:p>
+              <a:pPr lvl="0" algn="ctr"/>
+              <a:r>
+                <a:rPr lang="de-DE" dirty="0" smtClean="0">
+                  <a:solidFill>
+                    <a:prstClr val="black"/>
+                  </a:solidFill>
+                  <a:latin typeface="Consolas"/>
+                  <a:cs typeface="Consolas"/>
+                </a:rPr>
+                <a:t>14</a:t>
+              </a:r>
+              <a:r>
+                <a:rPr lang="de-DE" dirty="0">
+                  <a:solidFill>
+                    <a:prstClr val="black"/>
+                  </a:solidFill>
+                  <a:latin typeface="Consolas"/>
+                  <a:cs typeface="Consolas"/>
+                </a:rPr>
+                <a:t>: aload_1</a:t>
+              </a:r>
+            </a:p>
+            <a:p>
+              <a:pPr lvl="0" algn="ctr"/>
+              <a:r>
+                <a:rPr lang="de-DE" dirty="0">
+                  <a:solidFill>
+                    <a:prstClr val="black"/>
+                  </a:solidFill>
+                  <a:latin typeface="Consolas"/>
+                  <a:cs typeface="Consolas"/>
+                </a:rPr>
+                <a:t>15: </a:t>
+              </a:r>
+              <a:r>
+                <a:rPr lang="de-DE" dirty="0" err="1" smtClean="0">
+                  <a:solidFill>
+                    <a:prstClr val="black"/>
+                  </a:solidFill>
+                  <a:latin typeface="Consolas"/>
+                  <a:cs typeface="Consolas"/>
+                </a:rPr>
+                <a:t>iload</a:t>
+              </a:r>
+              <a:r>
+                <a:rPr lang="de-DE" dirty="0" smtClean="0">
+                  <a:solidFill>
+                    <a:prstClr val="black"/>
+                  </a:solidFill>
+                  <a:latin typeface="Consolas"/>
+                  <a:cs typeface="Consolas"/>
+                </a:rPr>
+                <a:t> 4</a:t>
+              </a:r>
+            </a:p>
+            <a:p>
+              <a:pPr lvl="0" algn="ctr"/>
+              <a:r>
+                <a:rPr lang="de-DE" dirty="0" smtClean="0">
+                  <a:solidFill>
+                    <a:prstClr val="black"/>
+                  </a:solidFill>
+                  <a:latin typeface="Consolas"/>
+                  <a:cs typeface="Consolas"/>
+                </a:rPr>
+                <a:t>17: </a:t>
+              </a:r>
+              <a:r>
+                <a:rPr lang="de-DE" dirty="0" err="1" smtClean="0">
+                  <a:solidFill>
+                    <a:prstClr val="black"/>
+                  </a:solidFill>
+                  <a:latin typeface="Consolas"/>
+                  <a:cs typeface="Consolas"/>
+                </a:rPr>
+                <a:t>iaload</a:t>
+              </a:r>
+              <a:r>
+                <a:rPr lang="de-DE" dirty="0" err="1">
+                  <a:solidFill>
+                    <a:schemeClr val="bg1"/>
+                  </a:solidFill>
+                  <a:latin typeface="Consolas"/>
+                  <a:cs typeface="Consolas"/>
+                </a:rPr>
+                <a:t>s</a:t>
+              </a:r>
+              <a:endParaRPr lang="de-DE" dirty="0">
+                <a:solidFill>
+                  <a:schemeClr val="bg1"/>
+                </a:solidFill>
+                <a:latin typeface="Consolas"/>
+                <a:cs typeface="Consolas"/>
+              </a:endParaRPr>
+            </a:p>
+            <a:p>
+              <a:pPr lvl="0" algn="ctr"/>
+              <a:r>
+                <a:rPr lang="de-DE" dirty="0">
+                  <a:solidFill>
+                    <a:prstClr val="black"/>
+                  </a:solidFill>
+                  <a:latin typeface="Consolas"/>
+                  <a:cs typeface="Consolas"/>
+                </a:rPr>
+                <a:t>18: </a:t>
+              </a:r>
+              <a:r>
+                <a:rPr lang="de-DE" dirty="0" err="1" smtClean="0">
+                  <a:solidFill>
+                    <a:prstClr val="black"/>
+                  </a:solidFill>
+                  <a:latin typeface="Consolas"/>
+                  <a:cs typeface="Consolas"/>
+                </a:rPr>
+                <a:t>ifge</a:t>
+              </a:r>
+              <a:r>
+                <a:rPr lang="de-DE" dirty="0" smtClean="0">
+                  <a:solidFill>
+                    <a:prstClr val="black"/>
+                  </a:solidFill>
+                  <a:latin typeface="Consolas"/>
+                  <a:cs typeface="Consolas"/>
+                </a:rPr>
+                <a:t> 27</a:t>
+              </a:r>
+              <a:endParaRPr lang="de-DE" dirty="0">
+                <a:solidFill>
+                  <a:prstClr val="black"/>
+                </a:solidFill>
+                <a:latin typeface="Consolas"/>
+                <a:cs typeface="Consolas"/>
+              </a:endParaRPr>
+            </a:p>
+            <a:p>
+              <a:pPr algn="ctr"/>
+              <a:endParaRPr lang="en-US" dirty="0"/>
+            </a:p>
+          </p:txBody>
+        </p:sp>
+        <p:sp>
+          <p:nvSpPr>
+            <p:cNvPr id="5" name="Oval 4"/>
+            <p:cNvSpPr/>
+            <p:nvPr/>
+          </p:nvSpPr>
+          <p:spPr>
+            <a:xfrm>
+              <a:off x="1058332" y="1526685"/>
+              <a:ext cx="3369734" cy="1432397"/>
+            </a:xfrm>
+            <a:prstGeom prst="ellipse">
+              <a:avLst/>
+            </a:prstGeom>
+            <a:noFill/>
+            <a:ln>
+              <a:solidFill>
+                <a:schemeClr val="tx1"/>
+              </a:solidFill>
+            </a:ln>
+          </p:spPr>
+          <p:style>
+            <a:lnRef idx="1">
+              <a:schemeClr val="accent1"/>
+            </a:lnRef>
+            <a:fillRef idx="3">
+              <a:schemeClr val="accent1"/>
+            </a:fillRef>
+            <a:effectRef idx="2">
+              <a:schemeClr val="accent1"/>
+            </a:effectRef>
+            <a:fontRef idx="minor">
+              <a:schemeClr val="lt1"/>
+            </a:fontRef>
+          </p:style>
+          <p:txBody>
+            <a:bodyPr wrap="none" rtlCol="0" anchor="ctr">
+              <a:noAutofit/>
+            </a:bodyPr>
+            <a:lstStyle/>
+            <a:p>
+              <a:pPr lvl="0" algn="ctr"/>
+              <a:r>
+                <a:rPr lang="en-US" dirty="0" smtClean="0">
+                  <a:solidFill>
+                    <a:schemeClr val="tx1"/>
+                  </a:solidFill>
+                  <a:latin typeface="Consolas" panose="020B0609020204030204" pitchFamily="49" charset="0"/>
+                </a:rPr>
+                <a:t>(2)</a:t>
+              </a:r>
+            </a:p>
+            <a:p>
+              <a:pPr lvl="0" algn="ctr"/>
+              <a:r>
+                <a:rPr lang="en-US" dirty="0" smtClean="0">
+                  <a:solidFill>
+                    <a:schemeClr val="tx1"/>
+                  </a:solidFill>
+                  <a:latin typeface="Consolas" panose="020B0609020204030204" pitchFamily="49" charset="0"/>
+                </a:rPr>
+                <a:t>21</a:t>
+              </a:r>
+              <a:r>
+                <a:rPr lang="en-US" dirty="0">
+                  <a:solidFill>
+                    <a:schemeClr val="tx1"/>
+                  </a:solidFill>
+                  <a:latin typeface="Consolas" panose="020B0609020204030204" pitchFamily="49" charset="0"/>
+                </a:rPr>
+                <a:t>: </a:t>
+              </a:r>
+              <a:r>
+                <a:rPr lang="en-US" dirty="0" err="1" smtClean="0">
+                  <a:solidFill>
+                    <a:schemeClr val="tx1"/>
+                  </a:solidFill>
+                  <a:latin typeface="Consolas" panose="020B0609020204030204" pitchFamily="49" charset="0"/>
+                </a:rPr>
+                <a:t>iinc</a:t>
+              </a:r>
+              <a:r>
+                <a:rPr lang="en-US" dirty="0" smtClean="0">
+                  <a:solidFill>
+                    <a:schemeClr val="tx1"/>
+                  </a:solidFill>
+                  <a:latin typeface="Consolas" panose="020B0609020204030204" pitchFamily="49" charset="0"/>
+                </a:rPr>
+                <a:t> 2</a:t>
+              </a:r>
+              <a:r>
+                <a:rPr lang="en-US" dirty="0">
+                  <a:solidFill>
+                    <a:schemeClr val="tx1"/>
+                  </a:solidFill>
+                  <a:latin typeface="Consolas" panose="020B0609020204030204" pitchFamily="49" charset="0"/>
+                </a:rPr>
+                <a:t>, -1</a:t>
+              </a:r>
+            </a:p>
+            <a:p>
+              <a:pPr lvl="0" algn="ctr"/>
+              <a:r>
+                <a:rPr lang="en-US" dirty="0">
+                  <a:solidFill>
+                    <a:schemeClr val="tx1"/>
+                  </a:solidFill>
+                  <a:latin typeface="Consolas" panose="020B0609020204030204" pitchFamily="49" charset="0"/>
+                </a:rPr>
+                <a:t>24: </a:t>
+              </a:r>
+              <a:r>
+                <a:rPr lang="en-US" dirty="0" err="1" smtClean="0">
+                  <a:solidFill>
+                    <a:schemeClr val="tx1"/>
+                  </a:solidFill>
+                  <a:latin typeface="Consolas" panose="020B0609020204030204" pitchFamily="49" charset="0"/>
+                </a:rPr>
+                <a:t>goto</a:t>
+              </a:r>
+              <a:r>
+                <a:rPr lang="en-US" dirty="0" smtClean="0">
+                  <a:solidFill>
+                    <a:schemeClr val="tx1"/>
+                  </a:solidFill>
+                  <a:latin typeface="Consolas" panose="020B0609020204030204" pitchFamily="49" charset="0"/>
+                </a:rPr>
+                <a:t> 41</a:t>
+              </a:r>
+              <a:r>
+                <a:rPr lang="en-US" dirty="0" smtClean="0">
+                  <a:solidFill>
+                    <a:srgbClr val="FFFFFF"/>
+                  </a:solidFill>
+                  <a:latin typeface="Consolas" panose="020B0609020204030204" pitchFamily="49" charset="0"/>
+                </a:rPr>
+                <a:t>sss</a:t>
+              </a:r>
+              <a:endParaRPr lang="en-US" dirty="0">
+                <a:solidFill>
+                  <a:srgbClr val="FFFFFF"/>
+                </a:solidFill>
+                <a:latin typeface="Consolas" panose="020B0609020204030204" pitchFamily="49" charset="0"/>
+              </a:endParaRPr>
+            </a:p>
+          </p:txBody>
+        </p:sp>
+        <p:sp>
+          <p:nvSpPr>
+            <p:cNvPr id="6" name="Oval 5"/>
+            <p:cNvSpPr/>
+            <p:nvPr/>
+          </p:nvSpPr>
+          <p:spPr>
+            <a:xfrm>
+              <a:off x="6079064" y="1526685"/>
+              <a:ext cx="3369734" cy="1432397"/>
+            </a:xfrm>
+            <a:prstGeom prst="ellipse">
+              <a:avLst/>
+            </a:prstGeom>
+            <a:noFill/>
+            <a:ln>
+              <a:solidFill>
+                <a:schemeClr val="tx1"/>
+              </a:solidFill>
+            </a:ln>
+          </p:spPr>
+          <p:style>
+            <a:lnRef idx="1">
+              <a:schemeClr val="accent1"/>
+            </a:lnRef>
+            <a:fillRef idx="3">
+              <a:schemeClr val="accent1"/>
+            </a:fillRef>
+            <a:effectRef idx="2">
+              <a:schemeClr val="accent1"/>
+            </a:effectRef>
+            <a:fontRef idx="minor">
+              <a:schemeClr val="lt1"/>
+            </a:fontRef>
+          </p:style>
+          <p:txBody>
+            <a:bodyPr wrap="none" rtlCol="0" anchor="ctr">
+              <a:noAutofit/>
+            </a:bodyPr>
+            <a:lstStyle/>
+            <a:p>
+              <a:pPr lvl="0" algn="ctr"/>
+              <a:r>
+                <a:rPr lang="en-US" dirty="0" smtClean="0">
+                  <a:solidFill>
+                    <a:srgbClr val="000000"/>
+                  </a:solidFill>
+                  <a:latin typeface="Consolas" panose="020B0609020204030204" pitchFamily="49" charset="0"/>
+                </a:rPr>
+                <a:t>(3)</a:t>
+              </a:r>
+            </a:p>
+            <a:p>
+              <a:pPr lvl="0" algn="ctr"/>
+              <a:r>
+                <a:rPr lang="en-US" dirty="0" smtClean="0">
+                  <a:solidFill>
+                    <a:srgbClr val="000000"/>
+                  </a:solidFill>
+                  <a:latin typeface="Consolas" panose="020B0609020204030204" pitchFamily="49" charset="0"/>
+                </a:rPr>
+                <a:t>27</a:t>
+              </a:r>
+              <a:r>
+                <a:rPr lang="en-US" dirty="0">
+                  <a:solidFill>
+                    <a:srgbClr val="000000"/>
+                  </a:solidFill>
+                  <a:latin typeface="Consolas" panose="020B0609020204030204" pitchFamily="49" charset="0"/>
+                </a:rPr>
+                <a:t>: aload_1</a:t>
+              </a:r>
+            </a:p>
+            <a:p>
+              <a:pPr lvl="0" algn="ctr"/>
+              <a:r>
+                <a:rPr lang="en-US" dirty="0">
+                  <a:solidFill>
+                    <a:srgbClr val="000000"/>
+                  </a:solidFill>
+                  <a:latin typeface="Consolas" panose="020B0609020204030204" pitchFamily="49" charset="0"/>
+                </a:rPr>
+                <a:t>28: </a:t>
+              </a:r>
+              <a:r>
+                <a:rPr lang="en-US" dirty="0" err="1" smtClean="0">
+                  <a:solidFill>
+                    <a:srgbClr val="000000"/>
+                  </a:solidFill>
+                  <a:latin typeface="Consolas" panose="020B0609020204030204" pitchFamily="49" charset="0"/>
+                </a:rPr>
+                <a:t>iload</a:t>
+              </a:r>
+              <a:r>
+                <a:rPr lang="en-US" dirty="0" smtClean="0">
+                  <a:solidFill>
+                    <a:srgbClr val="000000"/>
+                  </a:solidFill>
+                  <a:latin typeface="Consolas" panose="020B0609020204030204" pitchFamily="49" charset="0"/>
+                </a:rPr>
+                <a:t> 4</a:t>
+              </a:r>
+              <a:endParaRPr lang="en-US" dirty="0">
+                <a:solidFill>
+                  <a:srgbClr val="000000"/>
+                </a:solidFill>
+                <a:latin typeface="Consolas" panose="020B0609020204030204" pitchFamily="49" charset="0"/>
+              </a:endParaRPr>
+            </a:p>
+            <a:p>
+              <a:pPr lvl="0" algn="ctr"/>
+              <a:r>
+                <a:rPr lang="en-US" dirty="0">
+                  <a:solidFill>
+                    <a:srgbClr val="000000"/>
+                  </a:solidFill>
+                  <a:latin typeface="Consolas" panose="020B0609020204030204" pitchFamily="49" charset="0"/>
+                </a:rPr>
+                <a:t>30: </a:t>
+              </a:r>
+              <a:r>
+                <a:rPr lang="en-US" dirty="0" err="1" smtClean="0">
+                  <a:solidFill>
+                    <a:srgbClr val="000000"/>
+                  </a:solidFill>
+                  <a:latin typeface="Consolas" panose="020B0609020204030204" pitchFamily="49" charset="0"/>
+                </a:rPr>
+                <a:t>iaload</a:t>
+              </a:r>
+              <a:r>
+                <a:rPr lang="en-US" dirty="0" err="1" smtClean="0">
+                  <a:solidFill>
+                    <a:srgbClr val="FFFFFF"/>
+                  </a:solidFill>
+                  <a:latin typeface="Consolas" panose="020B0609020204030204" pitchFamily="49" charset="0"/>
+                </a:rPr>
+                <a:t>s</a:t>
+              </a:r>
+              <a:endParaRPr lang="en-US" dirty="0">
+                <a:solidFill>
+                  <a:srgbClr val="FFFFFF"/>
+                </a:solidFill>
+                <a:latin typeface="Consolas" panose="020B0609020204030204" pitchFamily="49" charset="0"/>
+              </a:endParaRPr>
+            </a:p>
+            <a:p>
+              <a:pPr lvl="0" algn="ctr"/>
+              <a:r>
+                <a:rPr lang="en-US" dirty="0">
+                  <a:solidFill>
+                    <a:srgbClr val="000000"/>
+                  </a:solidFill>
+                  <a:latin typeface="Consolas" panose="020B0609020204030204" pitchFamily="49" charset="0"/>
+                </a:rPr>
+                <a:t>31: </a:t>
+              </a:r>
+              <a:r>
+                <a:rPr lang="en-US" dirty="0" err="1" smtClean="0">
+                  <a:solidFill>
+                    <a:srgbClr val="000000"/>
+                  </a:solidFill>
+                  <a:latin typeface="Consolas" panose="020B0609020204030204" pitchFamily="49" charset="0"/>
+                </a:rPr>
+                <a:t>ifle</a:t>
+              </a:r>
+              <a:r>
+                <a:rPr lang="en-US" dirty="0" smtClean="0">
+                  <a:solidFill>
+                    <a:srgbClr val="000000"/>
+                  </a:solidFill>
+                  <a:latin typeface="Consolas" panose="020B0609020204030204" pitchFamily="49" charset="0"/>
+                </a:rPr>
+                <a:t> 40</a:t>
+              </a:r>
+              <a:endParaRPr lang="en-US" dirty="0">
+                <a:solidFill>
+                  <a:srgbClr val="000000"/>
+                </a:solidFill>
+                <a:latin typeface="Consolas" panose="020B0609020204030204" pitchFamily="49" charset="0"/>
+              </a:endParaRPr>
+            </a:p>
+          </p:txBody>
+        </p:sp>
+        <p:sp>
+          <p:nvSpPr>
+            <p:cNvPr id="7" name="Oval 6"/>
+            <p:cNvSpPr/>
+            <p:nvPr/>
+          </p:nvSpPr>
+          <p:spPr>
+            <a:xfrm>
+              <a:off x="4157131" y="3131105"/>
+              <a:ext cx="3369734" cy="1432397"/>
+            </a:xfrm>
+            <a:prstGeom prst="ellipse">
+              <a:avLst/>
+            </a:prstGeom>
+            <a:noFill/>
+            <a:ln>
+              <a:solidFill>
+                <a:schemeClr val="tx1"/>
+              </a:solidFill>
+            </a:ln>
+          </p:spPr>
+          <p:style>
+            <a:lnRef idx="1">
+              <a:schemeClr val="accent1"/>
+            </a:lnRef>
+            <a:fillRef idx="3">
+              <a:schemeClr val="accent1"/>
+            </a:fillRef>
+            <a:effectRef idx="2">
+              <a:schemeClr val="accent1"/>
+            </a:effectRef>
+            <a:fontRef idx="minor">
+              <a:schemeClr val="lt1"/>
+            </a:fontRef>
+          </p:style>
+          <p:txBody>
+            <a:bodyPr wrap="none" rtlCol="0" anchor="ctr">
+              <a:noAutofit/>
+            </a:bodyPr>
+            <a:lstStyle/>
+            <a:p>
+              <a:pPr lvl="0" algn="ctr"/>
+              <a:r>
+                <a:rPr lang="en-US" dirty="0" smtClean="0">
+                  <a:solidFill>
+                    <a:schemeClr val="tx1"/>
+                  </a:solidFill>
+                  <a:latin typeface="Consolas" panose="020B0609020204030204" pitchFamily="49" charset="0"/>
+                </a:rPr>
+                <a:t>(4)</a:t>
+              </a:r>
+            </a:p>
+            <a:p>
+              <a:pPr lvl="0" algn="ctr"/>
+              <a:r>
+                <a:rPr lang="en-US" dirty="0" smtClean="0">
+                  <a:solidFill>
+                    <a:schemeClr val="tx1"/>
+                  </a:solidFill>
+                  <a:latin typeface="Consolas" panose="020B0609020204030204" pitchFamily="49" charset="0"/>
+                </a:rPr>
+                <a:t>34: </a:t>
+              </a:r>
+              <a:r>
+                <a:rPr lang="en-US" dirty="0" err="1" smtClean="0">
+                  <a:solidFill>
+                    <a:schemeClr val="tx1"/>
+                  </a:solidFill>
+                  <a:latin typeface="Consolas" panose="020B0609020204030204" pitchFamily="49" charset="0"/>
+                </a:rPr>
+                <a:t>iinc</a:t>
+              </a:r>
+              <a:r>
+                <a:rPr lang="en-US" dirty="0">
+                  <a:solidFill>
+                    <a:schemeClr val="tx1"/>
+                  </a:solidFill>
+                  <a:latin typeface="Consolas" panose="020B0609020204030204" pitchFamily="49" charset="0"/>
+                </a:rPr>
+                <a:t> </a:t>
+              </a:r>
+              <a:r>
+                <a:rPr lang="en-US" dirty="0" smtClean="0">
+                  <a:solidFill>
+                    <a:schemeClr val="tx1"/>
+                  </a:solidFill>
+                  <a:latin typeface="Consolas" panose="020B0609020204030204" pitchFamily="49" charset="0"/>
+                </a:rPr>
+                <a:t>2</a:t>
+              </a:r>
+              <a:r>
+                <a:rPr lang="en-US" dirty="0">
+                  <a:solidFill>
+                    <a:schemeClr val="tx1"/>
+                  </a:solidFill>
+                  <a:latin typeface="Consolas" panose="020B0609020204030204" pitchFamily="49" charset="0"/>
+                </a:rPr>
+                <a:t>, </a:t>
+              </a:r>
+              <a:r>
+                <a:rPr lang="en-US" dirty="0" smtClean="0">
+                  <a:solidFill>
+                    <a:schemeClr val="tx1"/>
+                  </a:solidFill>
+                  <a:latin typeface="Consolas" panose="020B0609020204030204" pitchFamily="49" charset="0"/>
+                </a:rPr>
+                <a:t>1</a:t>
+              </a:r>
+              <a:r>
+                <a:rPr lang="en-US" dirty="0" smtClean="0">
+                  <a:solidFill>
+                    <a:srgbClr val="FFFFFF"/>
+                  </a:solidFill>
+                  <a:latin typeface="Consolas" panose="020B0609020204030204" pitchFamily="49" charset="0"/>
+                </a:rPr>
+                <a:t>s</a:t>
+              </a:r>
+              <a:endParaRPr lang="en-US" dirty="0">
+                <a:solidFill>
+                  <a:srgbClr val="FFFFFF"/>
+                </a:solidFill>
+                <a:latin typeface="Consolas" panose="020B0609020204030204" pitchFamily="49" charset="0"/>
+              </a:endParaRPr>
+            </a:p>
+            <a:p>
+              <a:pPr lvl="0" algn="ctr"/>
+              <a:r>
+                <a:rPr lang="en-US" dirty="0" smtClean="0">
+                  <a:solidFill>
+                    <a:schemeClr val="tx1"/>
+                  </a:solidFill>
+                  <a:latin typeface="Consolas" panose="020B0609020204030204" pitchFamily="49" charset="0"/>
+                </a:rPr>
+                <a:t>37: </a:t>
+              </a:r>
+              <a:r>
+                <a:rPr lang="en-US" dirty="0" err="1" smtClean="0">
+                  <a:solidFill>
+                    <a:schemeClr val="tx1"/>
+                  </a:solidFill>
+                  <a:latin typeface="Consolas" panose="020B0609020204030204" pitchFamily="49" charset="0"/>
+                </a:rPr>
+                <a:t>goto</a:t>
+              </a:r>
+              <a:r>
+                <a:rPr lang="en-US" dirty="0">
+                  <a:solidFill>
+                    <a:schemeClr val="tx1"/>
+                  </a:solidFill>
+                  <a:latin typeface="Consolas" panose="020B0609020204030204" pitchFamily="49" charset="0"/>
+                </a:rPr>
+                <a:t> </a:t>
+              </a:r>
+              <a:r>
+                <a:rPr lang="en-US" dirty="0" smtClean="0">
+                  <a:solidFill>
+                    <a:schemeClr val="tx1"/>
+                  </a:solidFill>
+                  <a:latin typeface="Consolas" panose="020B0609020204030204" pitchFamily="49" charset="0"/>
+                </a:rPr>
+                <a:t>41</a:t>
+              </a:r>
+              <a:r>
+                <a:rPr lang="en-US" dirty="0" smtClean="0">
+                  <a:solidFill>
+                    <a:srgbClr val="FFFFFF"/>
+                  </a:solidFill>
+                  <a:latin typeface="Consolas" panose="020B0609020204030204" pitchFamily="49" charset="0"/>
+                </a:rPr>
+                <a:t>sss</a:t>
+              </a:r>
+              <a:endParaRPr lang="en-US" dirty="0">
+                <a:solidFill>
+                  <a:srgbClr val="FFFFFF"/>
+                </a:solidFill>
+                <a:latin typeface="Consolas" panose="020B0609020204030204" pitchFamily="49" charset="0"/>
+              </a:endParaRPr>
+            </a:p>
+          </p:txBody>
+        </p:sp>
+        <p:sp>
+          <p:nvSpPr>
+            <p:cNvPr id="8" name="Oval 7"/>
+            <p:cNvSpPr/>
+            <p:nvPr/>
+          </p:nvSpPr>
+          <p:spPr>
+            <a:xfrm>
+              <a:off x="7933265" y="3131105"/>
+              <a:ext cx="3369734" cy="1432397"/>
+            </a:xfrm>
+            <a:prstGeom prst="ellipse">
+              <a:avLst/>
+            </a:prstGeom>
+            <a:noFill/>
+            <a:ln>
+              <a:solidFill>
+                <a:schemeClr val="tx1"/>
+              </a:solidFill>
+            </a:ln>
+          </p:spPr>
+          <p:style>
+            <a:lnRef idx="1">
+              <a:schemeClr val="accent1"/>
+            </a:lnRef>
+            <a:fillRef idx="3">
+              <a:schemeClr val="accent1"/>
+            </a:fillRef>
+            <a:effectRef idx="2">
+              <a:schemeClr val="accent1"/>
+            </a:effectRef>
+            <a:fontRef idx="minor">
+              <a:schemeClr val="lt1"/>
+            </a:fontRef>
+          </p:style>
+          <p:txBody>
+            <a:bodyPr wrap="none" rtlCol="0" anchor="ctr">
+              <a:noAutofit/>
+            </a:bodyPr>
+            <a:lstStyle/>
+            <a:p>
+              <a:pPr lvl="0" algn="ctr"/>
+              <a:r>
+                <a:rPr lang="en-US" dirty="0" smtClean="0">
+                  <a:solidFill>
+                    <a:srgbClr val="FF0000"/>
+                  </a:solidFill>
+                  <a:latin typeface="Consolas" panose="020B0609020204030204" pitchFamily="49" charset="0"/>
+                </a:rPr>
+                <a:t>(5)</a:t>
+              </a:r>
+            </a:p>
+            <a:p>
+              <a:pPr lvl="0" algn="ctr"/>
+              <a:r>
+                <a:rPr lang="en-US" dirty="0" smtClean="0">
+                  <a:solidFill>
+                    <a:srgbClr val="FF0000"/>
+                  </a:solidFill>
+                  <a:latin typeface="Consolas" panose="020B0609020204030204" pitchFamily="49" charset="0"/>
+                </a:rPr>
+                <a:t>40: return</a:t>
+              </a:r>
+              <a:endParaRPr lang="en-US" dirty="0">
+                <a:solidFill>
+                  <a:srgbClr val="FF0000"/>
+                </a:solidFill>
+                <a:latin typeface="Consolas" panose="020B0609020204030204" pitchFamily="49" charset="0"/>
+              </a:endParaRPr>
+            </a:p>
+          </p:txBody>
+        </p:sp>
+        <p:sp>
+          <p:nvSpPr>
+            <p:cNvPr id="9" name="Oval 8"/>
+            <p:cNvSpPr/>
+            <p:nvPr/>
+          </p:nvSpPr>
+          <p:spPr>
+            <a:xfrm>
+              <a:off x="3581398" y="5188531"/>
+              <a:ext cx="3369734" cy="1432397"/>
+            </a:xfrm>
+            <a:prstGeom prst="ellipse">
+              <a:avLst/>
+            </a:prstGeom>
+            <a:noFill/>
+            <a:ln>
+              <a:solidFill>
+                <a:schemeClr val="tx1"/>
+              </a:solidFill>
+            </a:ln>
+          </p:spPr>
+          <p:style>
+            <a:lnRef idx="1">
+              <a:schemeClr val="accent1"/>
+            </a:lnRef>
+            <a:fillRef idx="3">
+              <a:schemeClr val="accent1"/>
+            </a:fillRef>
+            <a:effectRef idx="2">
+              <a:schemeClr val="accent1"/>
+            </a:effectRef>
+            <a:fontRef idx="minor">
+              <a:schemeClr val="lt1"/>
+            </a:fontRef>
+          </p:style>
+          <p:txBody>
+            <a:bodyPr wrap="none" rtlCol="0" anchor="ctr">
+              <a:noAutofit/>
+            </a:bodyPr>
+            <a:lstStyle/>
+            <a:p>
+              <a:pPr lvl="0" algn="ctr"/>
+              <a:r>
+                <a:rPr lang="en-US" dirty="0" smtClean="0">
+                  <a:solidFill>
+                    <a:schemeClr val="tx1"/>
+                  </a:solidFill>
+                  <a:latin typeface="Consolas" panose="020B0609020204030204" pitchFamily="49" charset="0"/>
+                </a:rPr>
+                <a:t>(6)</a:t>
+              </a:r>
+            </a:p>
+            <a:p>
+              <a:pPr lvl="0" algn="ctr"/>
+              <a:r>
+                <a:rPr lang="en-US" dirty="0" smtClean="0">
+                  <a:solidFill>
+                    <a:schemeClr val="tx1"/>
+                  </a:solidFill>
+                  <a:latin typeface="Consolas" panose="020B0609020204030204" pitchFamily="49" charset="0"/>
+                </a:rPr>
+                <a:t>41: </a:t>
+              </a:r>
+              <a:r>
+                <a:rPr lang="en-US" dirty="0" err="1" smtClean="0">
+                  <a:solidFill>
+                    <a:schemeClr val="tx1"/>
+                  </a:solidFill>
+                  <a:latin typeface="Consolas" panose="020B0609020204030204" pitchFamily="49" charset="0"/>
+                </a:rPr>
+                <a:t>iinc</a:t>
+              </a:r>
+              <a:r>
+                <a:rPr lang="en-US" dirty="0" smtClean="0">
+                  <a:solidFill>
+                    <a:schemeClr val="tx1"/>
+                  </a:solidFill>
+                  <a:latin typeface="Consolas" panose="020B0609020204030204" pitchFamily="49" charset="0"/>
+                </a:rPr>
+                <a:t> 4, 1</a:t>
+              </a:r>
+            </a:p>
+            <a:p>
+              <a:pPr lvl="0" algn="ctr"/>
+              <a:r>
+                <a:rPr lang="en-US" dirty="0" smtClean="0">
+                  <a:solidFill>
+                    <a:schemeClr val="tx1"/>
+                  </a:solidFill>
+                  <a:latin typeface="Consolas" panose="020B0609020204030204" pitchFamily="49" charset="0"/>
+                </a:rPr>
+                <a:t>44: </a:t>
+              </a:r>
+              <a:r>
+                <a:rPr lang="en-US" dirty="0" err="1" smtClean="0">
+                  <a:solidFill>
+                    <a:schemeClr val="tx1"/>
+                  </a:solidFill>
+                  <a:latin typeface="Consolas" panose="020B0609020204030204" pitchFamily="49" charset="0"/>
+                </a:rPr>
+                <a:t>goto</a:t>
+              </a:r>
+              <a:r>
+                <a:rPr lang="en-US" dirty="0">
+                  <a:solidFill>
+                    <a:schemeClr val="tx1"/>
+                  </a:solidFill>
+                  <a:latin typeface="Consolas" panose="020B0609020204030204" pitchFamily="49" charset="0"/>
+                </a:rPr>
+                <a:t> </a:t>
+              </a:r>
+              <a:r>
+                <a:rPr lang="en-US" dirty="0" smtClean="0">
+                  <a:solidFill>
+                    <a:schemeClr val="tx1"/>
+                  </a:solidFill>
+                  <a:latin typeface="Consolas" panose="020B0609020204030204" pitchFamily="49" charset="0"/>
+                </a:rPr>
+                <a:t>8</a:t>
+              </a:r>
+              <a:r>
+                <a:rPr lang="en-US" dirty="0" smtClean="0">
+                  <a:solidFill>
+                    <a:srgbClr val="FFFFFF"/>
+                  </a:solidFill>
+                  <a:latin typeface="Consolas" panose="020B0609020204030204" pitchFamily="49" charset="0"/>
+                </a:rPr>
+                <a:t>sss</a:t>
+              </a:r>
+              <a:endParaRPr lang="en-US" dirty="0">
+                <a:solidFill>
+                  <a:srgbClr val="FFFFFF"/>
+                </a:solidFill>
+                <a:latin typeface="Consolas" panose="020B0609020204030204" pitchFamily="49" charset="0"/>
+              </a:endParaRPr>
+            </a:p>
+          </p:txBody>
+        </p:sp>
+        <p:cxnSp>
+          <p:nvCxnSpPr>
+            <p:cNvPr id="10" name="Straight Arrow Connector 9"/>
+            <p:cNvCxnSpPr>
+              <a:stCxn id="4" idx="3"/>
+              <a:endCxn id="5" idx="7"/>
+            </p:cNvCxnSpPr>
+            <p:nvPr/>
+          </p:nvCxnSpPr>
+          <p:spPr>
+            <a:xfrm flipH="1">
+              <a:off x="3934580" y="1348096"/>
+              <a:ext cx="140304" cy="388359"/>
+            </a:xfrm>
+            <a:prstGeom prst="straightConnector1">
+              <a:avLst/>
+            </a:prstGeom>
+            <a:ln>
+              <a:solidFill>
+                <a:schemeClr val="tx1"/>
+              </a:solidFill>
+              <a:prstDash val="dash"/>
+              <a:tailEnd type="arrow"/>
+            </a:ln>
+          </p:spPr>
+          <p:style>
+            <a:lnRef idx="2">
+              <a:schemeClr val="accent1"/>
+            </a:lnRef>
+            <a:fillRef idx="0">
+              <a:schemeClr val="accent1"/>
+            </a:fillRef>
+            <a:effectRef idx="1">
+              <a:schemeClr val="accent1"/>
+            </a:effectRef>
+            <a:fontRef idx="minor">
+              <a:schemeClr val="tx1"/>
+            </a:fontRef>
+          </p:style>
+        </p:cxnSp>
+        <p:cxnSp>
+          <p:nvCxnSpPr>
+            <p:cNvPr id="11" name="Straight Arrow Connector 10"/>
+            <p:cNvCxnSpPr>
+              <a:stCxn id="4" idx="5"/>
+              <a:endCxn id="6" idx="1"/>
+            </p:cNvCxnSpPr>
+            <p:nvPr/>
+          </p:nvCxnSpPr>
+          <p:spPr>
+            <a:xfrm>
+              <a:off x="6457646" y="1348096"/>
+              <a:ext cx="114904" cy="388359"/>
+            </a:xfrm>
+            <a:prstGeom prst="straightConnector1">
+              <a:avLst/>
+            </a:prstGeom>
+            <a:ln>
+              <a:solidFill>
+                <a:schemeClr val="tx1"/>
+              </a:solidFill>
+              <a:prstDash val="dash"/>
+              <a:tailEnd type="arrow"/>
+            </a:ln>
+          </p:spPr>
+          <p:style>
+            <a:lnRef idx="2">
+              <a:schemeClr val="accent1"/>
+            </a:lnRef>
+            <a:fillRef idx="0">
+              <a:schemeClr val="accent1"/>
+            </a:fillRef>
+            <a:effectRef idx="1">
+              <a:schemeClr val="accent1"/>
+            </a:effectRef>
+            <a:fontRef idx="minor">
+              <a:schemeClr val="tx1"/>
+            </a:fontRef>
+          </p:style>
+        </p:cxnSp>
+        <p:cxnSp>
+          <p:nvCxnSpPr>
+            <p:cNvPr id="12" name="Straight Arrow Connector 11"/>
+            <p:cNvCxnSpPr>
+              <a:stCxn id="5" idx="4"/>
+              <a:endCxn id="9" idx="0"/>
+            </p:cNvCxnSpPr>
+            <p:nvPr/>
+          </p:nvCxnSpPr>
+          <p:spPr>
+            <a:xfrm>
+              <a:off x="2743199" y="2959082"/>
+              <a:ext cx="2523066" cy="2229449"/>
+            </a:xfrm>
+            <a:prstGeom prst="straightConnector1">
+              <a:avLst/>
+            </a:prstGeom>
+            <a:ln>
+              <a:solidFill>
+                <a:schemeClr val="tx1"/>
+              </a:solidFill>
+              <a:prstDash val="dash"/>
+              <a:tailEnd type="arrow"/>
+            </a:ln>
+          </p:spPr>
+          <p:style>
+            <a:lnRef idx="2">
+              <a:schemeClr val="accent1"/>
+            </a:lnRef>
+            <a:fillRef idx="0">
+              <a:schemeClr val="accent1"/>
+            </a:fillRef>
+            <a:effectRef idx="1">
+              <a:schemeClr val="accent1"/>
+            </a:effectRef>
+            <a:fontRef idx="minor">
+              <a:schemeClr val="tx1"/>
+            </a:fontRef>
+          </p:style>
+        </p:cxnSp>
+        <p:cxnSp>
+          <p:nvCxnSpPr>
+            <p:cNvPr id="13" name="Straight Arrow Connector 12"/>
+            <p:cNvCxnSpPr>
+              <a:stCxn id="6" idx="3"/>
+              <a:endCxn id="7" idx="0"/>
+            </p:cNvCxnSpPr>
+            <p:nvPr/>
+          </p:nvCxnSpPr>
+          <p:spPr>
+            <a:xfrm flipH="1">
+              <a:off x="5841998" y="2749312"/>
+              <a:ext cx="730552" cy="381793"/>
+            </a:xfrm>
+            <a:prstGeom prst="straightConnector1">
+              <a:avLst/>
+            </a:prstGeom>
+            <a:ln>
+              <a:solidFill>
+                <a:schemeClr val="tx1"/>
+              </a:solidFill>
+              <a:prstDash val="dash"/>
+              <a:tailEnd type="arrow"/>
+            </a:ln>
+          </p:spPr>
+          <p:style>
+            <a:lnRef idx="2">
+              <a:schemeClr val="accent1"/>
+            </a:lnRef>
+            <a:fillRef idx="0">
+              <a:schemeClr val="accent1"/>
+            </a:fillRef>
+            <a:effectRef idx="1">
+              <a:schemeClr val="accent1"/>
+            </a:effectRef>
+            <a:fontRef idx="minor">
+              <a:schemeClr val="tx1"/>
+            </a:fontRef>
+          </p:style>
+        </p:cxnSp>
+        <p:cxnSp>
+          <p:nvCxnSpPr>
+            <p:cNvPr id="14" name="Straight Arrow Connector 13"/>
+            <p:cNvCxnSpPr>
+              <a:stCxn id="6" idx="5"/>
+              <a:endCxn id="8" idx="0"/>
+            </p:cNvCxnSpPr>
+            <p:nvPr/>
+          </p:nvCxnSpPr>
+          <p:spPr>
+            <a:xfrm>
+              <a:off x="8955312" y="2749312"/>
+              <a:ext cx="662820" cy="381793"/>
+            </a:xfrm>
+            <a:prstGeom prst="straightConnector1">
+              <a:avLst/>
+            </a:prstGeom>
+            <a:ln>
+              <a:solidFill>
+                <a:schemeClr val="tx1"/>
+              </a:solidFill>
+              <a:prstDash val="dash"/>
+              <a:tailEnd type="arrow"/>
+            </a:ln>
+          </p:spPr>
+          <p:style>
+            <a:lnRef idx="2">
+              <a:schemeClr val="accent1"/>
+            </a:lnRef>
+            <a:fillRef idx="0">
+              <a:schemeClr val="accent1"/>
+            </a:fillRef>
+            <a:effectRef idx="1">
+              <a:schemeClr val="accent1"/>
+            </a:effectRef>
+            <a:fontRef idx="minor">
+              <a:schemeClr val="tx1"/>
+            </a:fontRef>
+          </p:style>
+        </p:cxnSp>
+        <p:cxnSp>
+          <p:nvCxnSpPr>
+            <p:cNvPr id="15" name="Straight Arrow Connector 14"/>
+            <p:cNvCxnSpPr>
+              <a:stCxn id="7" idx="4"/>
+              <a:endCxn id="9" idx="0"/>
+            </p:cNvCxnSpPr>
+            <p:nvPr/>
+          </p:nvCxnSpPr>
+          <p:spPr>
+            <a:xfrm flipH="1">
+              <a:off x="5266265" y="4563502"/>
+              <a:ext cx="575733" cy="625029"/>
+            </a:xfrm>
+            <a:prstGeom prst="straightConnector1">
+              <a:avLst/>
+            </a:prstGeom>
+            <a:ln>
+              <a:solidFill>
+                <a:schemeClr val="tx1"/>
+              </a:solidFill>
+              <a:prstDash val="dash"/>
+              <a:tailEnd type="arrow"/>
+            </a:ln>
+          </p:spPr>
+          <p:style>
+            <a:lnRef idx="2">
+              <a:schemeClr val="accent1"/>
+            </a:lnRef>
+            <a:fillRef idx="0">
+              <a:schemeClr val="accent1"/>
+            </a:fillRef>
+            <a:effectRef idx="1">
+              <a:schemeClr val="accent1"/>
+            </a:effectRef>
+            <a:fontRef idx="minor">
+              <a:schemeClr val="tx1"/>
+            </a:fontRef>
+          </p:style>
+        </p:cxnSp>
+        <p:cxnSp>
+          <p:nvCxnSpPr>
+            <p:cNvPr id="16" name="Straight Arrow Connector 15"/>
+            <p:cNvCxnSpPr>
+              <a:stCxn id="8" idx="4"/>
+              <a:endCxn id="9" idx="0"/>
+            </p:cNvCxnSpPr>
+            <p:nvPr/>
+          </p:nvCxnSpPr>
+          <p:spPr>
+            <a:xfrm flipH="1">
+              <a:off x="5266265" y="4563502"/>
+              <a:ext cx="4351867" cy="625029"/>
+            </a:xfrm>
+            <a:prstGeom prst="straightConnector1">
+              <a:avLst/>
+            </a:prstGeom>
+            <a:ln>
+              <a:solidFill>
+                <a:schemeClr val="tx1"/>
+              </a:solidFill>
+              <a:prstDash val="dash"/>
+              <a:tailEnd type="arrow"/>
+            </a:ln>
+          </p:spPr>
+          <p:style>
+            <a:lnRef idx="2">
+              <a:schemeClr val="accent1"/>
+            </a:lnRef>
+            <a:fillRef idx="0">
+              <a:schemeClr val="accent1"/>
+            </a:fillRef>
+            <a:effectRef idx="1">
+              <a:schemeClr val="accent1"/>
+            </a:effectRef>
+            <a:fontRef idx="minor">
+              <a:schemeClr val="tx1"/>
+            </a:fontRef>
+          </p:style>
+        </p:cxnSp>
+      </p:grpSp>
+    </p:spTree>
+    <p:extLst>
+      <p:ext uri="{BB962C8B-B14F-4D97-AF65-F5344CB8AC3E}">
+        <p14:creationId xmlns:p14="http://schemas.microsoft.com/office/powerpoint/2010/main" val="1226507747"/>
+      </p:ext>
+    </p:extLst>
+  </p:cSld>
+  <p:clrMapOvr>
+    <a:masterClrMapping/>
+  </p:clrMapOvr>
 </p:sld>
 </file>
 
@@ -10785,7 +12858,7 @@
   <a:extraClrSchemeLst/>
   <a:extLst>
     <a:ext uri="{05A4C25C-085E-4340-85A3-A5531E510DB2}">
-      <thm15:themeFamily xmlns="" xmlns:thm15="http://schemas.microsoft.com/office/thememl/2012/main" name="Testing.potx" id="{A5FA5B82-E600-4A7E-8AE1-C06213944F22}" vid="{FF5EF395-F461-41AE-BF11-49871E4AB0B8}"/>
+      <thm15:themeFamily xmlns:thm15="http://schemas.microsoft.com/office/thememl/2012/main" xmlns="" name="Testing.potx" id="{A5FA5B82-E600-4A7E-8AE1-C06213944F22}" vid="{FF5EF395-F461-41AE-BF11-49871E4AB0B8}"/>
     </a:ext>
   </a:extLst>
 </a:theme>
@@ -11046,7 +13119,7 @@
   <a:extraClrSchemeLst/>
   <a:extLst>
     <a:ext uri="{05A4C25C-085E-4340-85A3-A5531E510DB2}">
-      <thm15:themeFamily xmlns="" xmlns:thm15="http://schemas.microsoft.com/office/thememl/2012/main" name="Office Theme" id="{62F939B6-93AF-4DB8-9C6B-D6C7DFDC589F}" vid="{4A3C46E8-61CC-4603-A589-7422A47A8E4A}"/>
+      <thm15:themeFamily xmlns:thm15="http://schemas.microsoft.com/office/thememl/2012/main" xmlns="" name="Office Theme" id="{62F939B6-93AF-4DB8-9C6B-D6C7DFDC589F}" vid="{4A3C46E8-61CC-4603-A589-7422A47A8E4A}"/>
     </a:ext>
   </a:extLst>
 </a:theme>

</xml_diff>

<commit_message>
Minor edit to test JPF deadline extension
</commit_message>
<xml_diff>
--- a/figures/bytecode_stream.pptx
+++ b/figures/bytecode_stream.pptx
@@ -12314,14 +12314,14 @@
             <p:cNvPr id="10" name="Straight Arrow Connector 9"/>
             <p:cNvCxnSpPr>
               <a:stCxn id="4" idx="3"/>
-              <a:endCxn id="5" idx="7"/>
+              <a:endCxn id="5" idx="0"/>
             </p:cNvCxnSpPr>
             <p:nvPr/>
           </p:nvCxnSpPr>
           <p:spPr>
             <a:xfrm flipH="1">
-              <a:off x="3934580" y="1348096"/>
-              <a:ext cx="140304" cy="388359"/>
+              <a:off x="2743199" y="1348096"/>
+              <a:ext cx="1331685" cy="178589"/>
             </a:xfrm>
             <a:prstGeom prst="straightConnector1">
               <a:avLst/>
@@ -12354,14 +12354,14 @@
             <p:cNvPr id="11" name="Straight Arrow Connector 10"/>
             <p:cNvCxnSpPr>
               <a:stCxn id="4" idx="5"/>
-              <a:endCxn id="6" idx="1"/>
+              <a:endCxn id="6" idx="0"/>
             </p:cNvCxnSpPr>
             <p:nvPr/>
           </p:nvCxnSpPr>
           <p:spPr>
             <a:xfrm>
               <a:off x="6457646" y="1348096"/>
-              <a:ext cx="114904" cy="388359"/>
+              <a:ext cx="1306285" cy="178589"/>
             </a:xfrm>
             <a:prstGeom prst="straightConnector1">
               <a:avLst/>

</xml_diff>

<commit_message>
Committing the pptx file containing the figures
</commit_message>
<xml_diff>
--- a/figures/bytecode_stream.pptx
+++ b/figures/bytecode_stream.pptx
@@ -116,7 +116,7 @@
   </p:defaultTextStyle>
   <p:extLst>
     <p:ext uri="{EFAFB233-063F-42B5-8137-9DF3F51BA10A}">
-      <p15:sldGuideLst xmlns:p15="http://schemas.microsoft.com/office/powerpoint/2012/main" xmlns=""/>
+      <p15:sldGuideLst xmlns="" xmlns:p15="http://schemas.microsoft.com/office/powerpoint/2012/main"/>
     </p:ext>
   </p:extLst>
 </p:presentation>
@@ -204,7 +204,7 @@
           <a:p>
             <a:fld id="{47269C7D-66B8-4E3F-AC3C-5029E193320D}" type="datetimeFigureOut">
               <a:rPr lang="en-US" smtClean="0"/>
-              <a:t>8/4/17</a:t>
+              <a:t>9/21/17</a:t>
             </a:fld>
             <a:endParaRPr lang="en-US"/>
           </a:p>
@@ -1191,7 +1191,7 @@
           <a:p>
             <a:fld id="{ED462A52-E5EA-4AB1-B69C-5C6AB89ECFFE}" type="datetimeFigureOut">
               <a:rPr lang="en-US" smtClean="0"/>
-              <a:t>8/4/17</a:t>
+              <a:t>9/21/17</a:t>
             </a:fld>
             <a:endParaRPr lang="en-US"/>
           </a:p>
@@ -1361,7 +1361,7 @@
           <a:p>
             <a:fld id="{ED462A52-E5EA-4AB1-B69C-5C6AB89ECFFE}" type="datetimeFigureOut">
               <a:rPr lang="en-US" smtClean="0"/>
-              <a:t>8/4/17</a:t>
+              <a:t>9/21/17</a:t>
             </a:fld>
             <a:endParaRPr lang="en-US"/>
           </a:p>
@@ -1541,7 +1541,7 @@
           <a:p>
             <a:fld id="{ED462A52-E5EA-4AB1-B69C-5C6AB89ECFFE}" type="datetimeFigureOut">
               <a:rPr lang="en-US" smtClean="0"/>
-              <a:t>8/4/17</a:t>
+              <a:t>9/21/17</a:t>
             </a:fld>
             <a:endParaRPr lang="en-US"/>
           </a:p>
@@ -1727,7 +1727,7 @@
           <a:p>
             <a:fld id="{ED462A52-E5EA-4AB1-B69C-5C6AB89ECFFE}" type="datetimeFigureOut">
               <a:rPr lang="en-US" smtClean="0"/>
-              <a:t>8/4/17</a:t>
+              <a:t>9/21/17</a:t>
             </a:fld>
             <a:endParaRPr lang="en-US"/>
           </a:p>
@@ -1973,7 +1973,7 @@
           <a:p>
             <a:fld id="{ED462A52-E5EA-4AB1-B69C-5C6AB89ECFFE}" type="datetimeFigureOut">
               <a:rPr lang="en-US" smtClean="0"/>
-              <a:t>8/4/17</a:t>
+              <a:t>9/21/17</a:t>
             </a:fld>
             <a:endParaRPr lang="en-US"/>
           </a:p>
@@ -2210,7 +2210,7 @@
           <a:p>
             <a:fld id="{ED462A52-E5EA-4AB1-B69C-5C6AB89ECFFE}" type="datetimeFigureOut">
               <a:rPr lang="en-US" smtClean="0"/>
-              <a:t>8/4/17</a:t>
+              <a:t>9/21/17</a:t>
             </a:fld>
             <a:endParaRPr lang="en-US"/>
           </a:p>
@@ -2577,7 +2577,7 @@
           <a:p>
             <a:fld id="{ED462A52-E5EA-4AB1-B69C-5C6AB89ECFFE}" type="datetimeFigureOut">
               <a:rPr lang="en-US" smtClean="0"/>
-              <a:t>8/4/17</a:t>
+              <a:t>9/21/17</a:t>
             </a:fld>
             <a:endParaRPr lang="en-US"/>
           </a:p>
@@ -2700,7 +2700,7 @@
           <a:p>
             <a:fld id="{ED462A52-E5EA-4AB1-B69C-5C6AB89ECFFE}" type="datetimeFigureOut">
               <a:rPr lang="en-US" smtClean="0"/>
-              <a:t>8/4/17</a:t>
+              <a:t>9/21/17</a:t>
             </a:fld>
             <a:endParaRPr lang="en-US"/>
           </a:p>
@@ -2795,7 +2795,7 @@
           <a:p>
             <a:fld id="{ED462A52-E5EA-4AB1-B69C-5C6AB89ECFFE}" type="datetimeFigureOut">
               <a:rPr lang="en-US" smtClean="0"/>
-              <a:t>8/4/17</a:t>
+              <a:t>9/21/17</a:t>
             </a:fld>
             <a:endParaRPr lang="en-US"/>
           </a:p>
@@ -3072,7 +3072,7 @@
           <a:p>
             <a:fld id="{ED462A52-E5EA-4AB1-B69C-5C6AB89ECFFE}" type="datetimeFigureOut">
               <a:rPr lang="en-US" smtClean="0"/>
-              <a:t>8/4/17</a:t>
+              <a:t>9/21/17</a:t>
             </a:fld>
             <a:endParaRPr lang="en-US"/>
           </a:p>
@@ -3329,7 +3329,7 @@
           <a:p>
             <a:fld id="{ED462A52-E5EA-4AB1-B69C-5C6AB89ECFFE}" type="datetimeFigureOut">
               <a:rPr lang="en-US" smtClean="0"/>
-              <a:t>8/4/17</a:t>
+              <a:t>9/21/17</a:t>
             </a:fld>
             <a:endParaRPr lang="en-US"/>
           </a:p>
@@ -3542,7 +3542,7 @@
           <a:p>
             <a:fld id="{ED462A52-E5EA-4AB1-B69C-5C6AB89ECFFE}" type="datetimeFigureOut">
               <a:rPr lang="en-US" smtClean="0"/>
-              <a:t>8/4/17</a:t>
+              <a:t>9/21/17</a:t>
             </a:fld>
             <a:endParaRPr lang="en-US"/>
           </a:p>
@@ -11372,16 +11372,16 @@
       </p:grpSpPr>
       <p:grpSp>
         <p:nvGrpSpPr>
-          <p:cNvPr id="17" name="Group 16"/>
+          <p:cNvPr id="79" name="Group 78"/>
           <p:cNvGrpSpPr/>
           <p:nvPr/>
         </p:nvGrpSpPr>
         <p:grpSpPr>
           <a:xfrm>
-            <a:off x="1058332" y="125469"/>
-            <a:ext cx="10244667" cy="6495459"/>
-            <a:chOff x="1058332" y="125469"/>
-            <a:chExt cx="10244667" cy="6495459"/>
+            <a:off x="156632" y="125469"/>
+            <a:ext cx="10422468" cy="6343091"/>
+            <a:chOff x="156632" y="125469"/>
+            <a:chExt cx="10422468" cy="6343091"/>
           </a:xfrm>
         </p:grpSpPr>
         <p:sp>
@@ -11392,8 +11392,8 @@
           </p:nvSpPr>
           <p:spPr>
             <a:xfrm>
-              <a:off x="3581398" y="125469"/>
-              <a:ext cx="3369734" cy="1432397"/>
+              <a:off x="3575048" y="125469"/>
+              <a:ext cx="3255436" cy="1542477"/>
             </a:xfrm>
             <a:prstGeom prst="ellipse">
               <a:avLst/>
@@ -11457,7 +11457,7 @@
                   <a:latin typeface="Consolas"/>
                   <a:cs typeface="Consolas"/>
                 </a:rPr>
-                <a:t>14</a:t>
+                <a:t>11: </a:t>
               </a:r>
               <a:r>
                 <a:rPr lang="de-DE" dirty="0">
@@ -11467,20 +11467,20 @@
                   <a:latin typeface="Consolas"/>
                   <a:cs typeface="Consolas"/>
                 </a:rPr>
-                <a:t>: aload_1</a:t>
+                <a:t>aload_1</a:t>
               </a:r>
             </a:p>
             <a:p>
               <a:pPr lvl="0" algn="ctr"/>
               <a:r>
-                <a:rPr lang="de-DE" dirty="0">
+                <a:rPr lang="de-DE" dirty="0" smtClean="0">
                   <a:solidFill>
                     <a:prstClr val="black"/>
                   </a:solidFill>
                   <a:latin typeface="Consolas"/>
                   <a:cs typeface="Consolas"/>
                 </a:rPr>
-                <a:t>15: </a:t>
+                <a:t>12: </a:t>
               </a:r>
               <a:r>
                 <a:rPr lang="de-DE" dirty="0" err="1" smtClean="0">
@@ -11513,7 +11513,7 @@
                   <a:latin typeface="Consolas"/>
                   <a:cs typeface="Consolas"/>
                 </a:rPr>
-                <a:t>17: </a:t>
+                <a:t>14: </a:t>
               </a:r>
               <a:r>
                 <a:rPr lang="de-DE" dirty="0" err="1" smtClean="0">
@@ -11546,14 +11546,14 @@
             <a:p>
               <a:pPr lvl="0" algn="ctr"/>
               <a:r>
-                <a:rPr lang="de-DE" dirty="0">
+                <a:rPr lang="de-DE" dirty="0" smtClean="0">
                   <a:solidFill>
                     <a:prstClr val="black"/>
                   </a:solidFill>
                   <a:latin typeface="Consolas"/>
                   <a:cs typeface="Consolas"/>
                 </a:rPr>
-                <a:t>18: </a:t>
+                <a:t>15: </a:t>
               </a:r>
               <a:r>
                 <a:rPr lang="de-DE" dirty="0" err="1" smtClean="0">
@@ -11573,7 +11573,17 @@
                   <a:latin typeface="Consolas"/>
                   <a:cs typeface="Consolas"/>
                 </a:rPr>
-                <a:t> 27</a:t>
+                <a:t> </a:t>
+              </a:r>
+              <a:r>
+                <a:rPr lang="de-DE" dirty="0" smtClean="0">
+                  <a:solidFill>
+                    <a:prstClr val="black"/>
+                  </a:solidFill>
+                  <a:latin typeface="Consolas"/>
+                  <a:cs typeface="Consolas"/>
+                </a:rPr>
+                <a:t>24</a:t>
               </a:r>
               <a:endParaRPr lang="de-DE" dirty="0">
                 <a:solidFill>
@@ -11597,8 +11607,8 @@
           </p:nvSpPr>
           <p:spPr>
             <a:xfrm>
-              <a:off x="1058332" y="1526685"/>
-              <a:ext cx="3369734" cy="1432397"/>
+              <a:off x="156632" y="1556323"/>
+              <a:ext cx="3255436" cy="1542477"/>
             </a:xfrm>
             <a:prstGeom prst="ellipse">
               <a:avLst/>
@@ -11644,22 +11654,22 @@
             <a:p>
               <a:pPr lvl="0" algn="ctr"/>
               <a:r>
+                <a:rPr lang="en-US" dirty="0">
+                  <a:solidFill>
+                    <a:schemeClr val="tx1"/>
+                  </a:solidFill>
+                  <a:latin typeface="Consolas" panose="020B0609020204030204" pitchFamily="49" charset="0"/>
+                </a:rPr>
+                <a:t>1</a:t>
+              </a:r>
+              <a:r>
                 <a:rPr lang="en-US" dirty="0" smtClean="0">
                   <a:solidFill>
                     <a:schemeClr val="tx1"/>
                   </a:solidFill>
                   <a:latin typeface="Consolas" panose="020B0609020204030204" pitchFamily="49" charset="0"/>
                 </a:rPr>
-                <a:t>21</a:t>
-              </a:r>
-              <a:r>
-                <a:rPr lang="en-US" dirty="0">
-                  <a:solidFill>
-                    <a:schemeClr val="tx1"/>
-                  </a:solidFill>
-                  <a:latin typeface="Consolas" panose="020B0609020204030204" pitchFamily="49" charset="0"/>
-                </a:rPr>
-                <a:t>: </a:t>
+                <a:t>8: </a:t>
               </a:r>
               <a:r>
                 <a:rPr lang="en-US" dirty="0" err="1" smtClean="0">
@@ -11677,7 +11687,16 @@
                   </a:solidFill>
                   <a:latin typeface="Consolas" panose="020B0609020204030204" pitchFamily="49" charset="0"/>
                 </a:rPr>
-                <a:t> 2</a:t>
+                <a:t> </a:t>
+              </a:r>
+              <a:r>
+                <a:rPr lang="en-US" dirty="0" smtClean="0">
+                  <a:solidFill>
+                    <a:schemeClr val="tx1"/>
+                  </a:solidFill>
+                  <a:latin typeface="Consolas" panose="020B0609020204030204" pitchFamily="49" charset="0"/>
+                </a:rPr>
+                <a:t>3, </a:t>
               </a:r>
               <a:r>
                 <a:rPr lang="en-US" dirty="0">
@@ -11686,19 +11705,19 @@
                   </a:solidFill>
                   <a:latin typeface="Consolas" panose="020B0609020204030204" pitchFamily="49" charset="0"/>
                 </a:rPr>
-                <a:t>, -1</a:t>
+                <a:t>-1</a:t>
               </a:r>
             </a:p>
             <a:p>
               <a:pPr lvl="0" algn="ctr"/>
               <a:r>
-                <a:rPr lang="en-US" dirty="0">
+                <a:rPr lang="en-US" dirty="0" smtClean="0">
                   <a:solidFill>
                     <a:schemeClr val="tx1"/>
                   </a:solidFill>
                   <a:latin typeface="Consolas" panose="020B0609020204030204" pitchFamily="49" charset="0"/>
                 </a:rPr>
-                <a:t>24: </a:t>
+                <a:t>21: </a:t>
               </a:r>
               <a:r>
                 <a:rPr lang="en-US" dirty="0" err="1" smtClean="0">
@@ -11716,7 +11735,16 @@
                   </a:solidFill>
                   <a:latin typeface="Consolas" panose="020B0609020204030204" pitchFamily="49" charset="0"/>
                 </a:rPr>
-                <a:t> 41</a:t>
+                <a:t> </a:t>
+              </a:r>
+              <a:r>
+                <a:rPr lang="en-US" dirty="0" smtClean="0">
+                  <a:solidFill>
+                    <a:schemeClr val="tx1"/>
+                  </a:solidFill>
+                  <a:latin typeface="Consolas" panose="020B0609020204030204" pitchFamily="49" charset="0"/>
+                </a:rPr>
+                <a:t>34</a:t>
               </a:r>
               <a:r>
                 <a:rPr lang="en-US" dirty="0" smtClean="0">
@@ -11744,8 +11772,8 @@
           </p:nvSpPr>
           <p:spPr>
             <a:xfrm>
-              <a:off x="6079064" y="1526685"/>
-              <a:ext cx="3369734" cy="1432397"/>
+              <a:off x="7323664" y="1556323"/>
+              <a:ext cx="3255436" cy="1542477"/>
             </a:xfrm>
             <a:prstGeom prst="ellipse">
               <a:avLst/>
@@ -11797,7 +11825,7 @@
                   </a:solidFill>
                   <a:latin typeface="Consolas" panose="020B0609020204030204" pitchFamily="49" charset="0"/>
                 </a:rPr>
-                <a:t>27</a:t>
+                <a:t>24: </a:t>
               </a:r>
               <a:r>
                 <a:rPr lang="en-US" dirty="0">
@@ -11806,19 +11834,19 @@
                   </a:solidFill>
                   <a:latin typeface="Consolas" panose="020B0609020204030204" pitchFamily="49" charset="0"/>
                 </a:rPr>
-                <a:t>: aload_1</a:t>
+                <a:t>aload_1</a:t>
               </a:r>
             </a:p>
             <a:p>
               <a:pPr lvl="0" algn="ctr"/>
               <a:r>
-                <a:rPr lang="en-US" dirty="0">
+                <a:rPr lang="en-US" dirty="0" smtClean="0">
                   <a:solidFill>
                     <a:srgbClr val="000000"/>
                   </a:solidFill>
                   <a:latin typeface="Consolas" panose="020B0609020204030204" pitchFamily="49" charset="0"/>
                 </a:rPr>
-                <a:t>28: </a:t>
+                <a:t>25: </a:t>
               </a:r>
               <a:r>
                 <a:rPr lang="en-US" dirty="0" err="1" smtClean="0">
@@ -11848,13 +11876,22 @@
             <a:p>
               <a:pPr lvl="0" algn="ctr"/>
               <a:r>
-                <a:rPr lang="en-US" dirty="0">
+                <a:rPr lang="en-US" dirty="0" smtClean="0">
                   <a:solidFill>
                     <a:srgbClr val="000000"/>
                   </a:solidFill>
                   <a:latin typeface="Consolas" panose="020B0609020204030204" pitchFamily="49" charset="0"/>
                 </a:rPr>
-                <a:t>30: </a:t>
+                <a:t>27</a:t>
+              </a:r>
+              <a:r>
+                <a:rPr lang="en-US" dirty="0" smtClean="0">
+                  <a:solidFill>
+                    <a:srgbClr val="000000"/>
+                  </a:solidFill>
+                  <a:latin typeface="Consolas" panose="020B0609020204030204" pitchFamily="49" charset="0"/>
+                </a:rPr>
+                <a:t>: </a:t>
               </a:r>
               <a:r>
                 <a:rPr lang="en-US" dirty="0" err="1" smtClean="0">
@@ -11884,13 +11921,22 @@
             <a:p>
               <a:pPr lvl="0" algn="ctr"/>
               <a:r>
-                <a:rPr lang="en-US" dirty="0">
+                <a:rPr lang="en-US" dirty="0" smtClean="0">
                   <a:solidFill>
                     <a:srgbClr val="000000"/>
                   </a:solidFill>
                   <a:latin typeface="Consolas" panose="020B0609020204030204" pitchFamily="49" charset="0"/>
                 </a:rPr>
-                <a:t>31: </a:t>
+                <a:t>28</a:t>
+              </a:r>
+              <a:r>
+                <a:rPr lang="en-US" dirty="0" smtClean="0">
+                  <a:solidFill>
+                    <a:srgbClr val="000000"/>
+                  </a:solidFill>
+                  <a:latin typeface="Consolas" panose="020B0609020204030204" pitchFamily="49" charset="0"/>
+                </a:rPr>
+                <a:t>: </a:t>
               </a:r>
               <a:r>
                 <a:rPr lang="en-US" dirty="0" err="1" smtClean="0">
@@ -11908,7 +11954,16 @@
                   </a:solidFill>
                   <a:latin typeface="Consolas" panose="020B0609020204030204" pitchFamily="49" charset="0"/>
                 </a:rPr>
-                <a:t> 40</a:t>
+                <a:t> </a:t>
+              </a:r>
+              <a:r>
+                <a:rPr lang="en-US" dirty="0" smtClean="0">
+                  <a:solidFill>
+                    <a:srgbClr val="000000"/>
+                  </a:solidFill>
+                  <a:latin typeface="Consolas" panose="020B0609020204030204" pitchFamily="49" charset="0"/>
+                </a:rPr>
+                <a:t>34</a:t>
               </a:r>
               <a:endParaRPr lang="en-US" dirty="0">
                 <a:solidFill>
@@ -11927,8 +11982,8 @@
           </p:nvSpPr>
           <p:spPr>
             <a:xfrm>
-              <a:off x="4157131" y="3131105"/>
-              <a:ext cx="3369734" cy="1432397"/>
+              <a:off x="4449231" y="2783983"/>
+              <a:ext cx="3255436" cy="1542477"/>
             </a:xfrm>
             <a:prstGeom prst="ellipse">
               <a:avLst/>
@@ -11980,7 +12035,7 @@
                   </a:solidFill>
                   <a:latin typeface="Consolas" panose="020B0609020204030204" pitchFamily="49" charset="0"/>
                 </a:rPr>
-                <a:t>34: </a:t>
+                <a:t>31: </a:t>
               </a:r>
               <a:r>
                 <a:rPr lang="en-US" dirty="0" err="1" smtClean="0">
@@ -12001,22 +12056,13 @@
                 <a:t> </a:t>
               </a:r>
               <a:r>
-                <a:rPr lang="en-US" dirty="0" smtClean="0">
-                  <a:solidFill>
-                    <a:schemeClr val="tx1"/>
-                  </a:solidFill>
-                  <a:latin typeface="Consolas" panose="020B0609020204030204" pitchFamily="49" charset="0"/>
-                </a:rPr>
-                <a:t>2</a:t>
-              </a:r>
-              <a:r>
                 <a:rPr lang="en-US" dirty="0">
                   <a:solidFill>
                     <a:schemeClr val="tx1"/>
                   </a:solidFill>
                   <a:latin typeface="Consolas" panose="020B0609020204030204" pitchFamily="49" charset="0"/>
                 </a:rPr>
-                <a:t>, </a:t>
+                <a:t>3</a:t>
               </a:r>
               <a:r>
                 <a:rPr lang="en-US" dirty="0" smtClean="0">
@@ -12025,146 +12071,11 @@
                   </a:solidFill>
                   <a:latin typeface="Consolas" panose="020B0609020204030204" pitchFamily="49" charset="0"/>
                 </a:rPr>
-                <a:t>1</a:t>
-              </a:r>
-              <a:r>
-                <a:rPr lang="en-US" dirty="0" smtClean="0">
-                  <a:solidFill>
-                    <a:srgbClr val="FFFFFF"/>
-                  </a:solidFill>
-                  <a:latin typeface="Consolas" panose="020B0609020204030204" pitchFamily="49" charset="0"/>
-                </a:rPr>
-                <a:t>s</a:t>
+                <a:t>, 1</a:t>
               </a:r>
               <a:endParaRPr lang="en-US" dirty="0">
                 <a:solidFill>
                   <a:srgbClr val="FFFFFF"/>
-                </a:solidFill>
-                <a:latin typeface="Consolas" panose="020B0609020204030204" pitchFamily="49" charset="0"/>
-              </a:endParaRPr>
-            </a:p>
-            <a:p>
-              <a:pPr lvl="0" algn="ctr"/>
-              <a:r>
-                <a:rPr lang="en-US" dirty="0" smtClean="0">
-                  <a:solidFill>
-                    <a:schemeClr val="tx1"/>
-                  </a:solidFill>
-                  <a:latin typeface="Consolas" panose="020B0609020204030204" pitchFamily="49" charset="0"/>
-                </a:rPr>
-                <a:t>37: </a:t>
-              </a:r>
-              <a:r>
-                <a:rPr lang="en-US" dirty="0" err="1" smtClean="0">
-                  <a:solidFill>
-                    <a:schemeClr val="tx1"/>
-                  </a:solidFill>
-                  <a:latin typeface="Consolas" panose="020B0609020204030204" pitchFamily="49" charset="0"/>
-                </a:rPr>
-                <a:t>goto</a:t>
-              </a:r>
-              <a:r>
-                <a:rPr lang="en-US" dirty="0">
-                  <a:solidFill>
-                    <a:schemeClr val="tx1"/>
-                  </a:solidFill>
-                  <a:latin typeface="Consolas" panose="020B0609020204030204" pitchFamily="49" charset="0"/>
-                </a:rPr>
-                <a:t> </a:t>
-              </a:r>
-              <a:r>
-                <a:rPr lang="en-US" dirty="0" smtClean="0">
-                  <a:solidFill>
-                    <a:schemeClr val="tx1"/>
-                  </a:solidFill>
-                  <a:latin typeface="Consolas" panose="020B0609020204030204" pitchFamily="49" charset="0"/>
-                </a:rPr>
-                <a:t>41</a:t>
-              </a:r>
-              <a:r>
-                <a:rPr lang="en-US" dirty="0" smtClean="0">
-                  <a:solidFill>
-                    <a:srgbClr val="FFFFFF"/>
-                  </a:solidFill>
-                  <a:latin typeface="Consolas" panose="020B0609020204030204" pitchFamily="49" charset="0"/>
-                </a:rPr>
-                <a:t>sss</a:t>
-              </a:r>
-              <a:endParaRPr lang="en-US" dirty="0">
-                <a:solidFill>
-                  <a:srgbClr val="FFFFFF"/>
-                </a:solidFill>
-                <a:latin typeface="Consolas" panose="020B0609020204030204" pitchFamily="49" charset="0"/>
-              </a:endParaRPr>
-            </a:p>
-          </p:txBody>
-        </p:sp>
-        <p:sp>
-          <p:nvSpPr>
-            <p:cNvPr id="8" name="Oval 7"/>
-            <p:cNvSpPr/>
-            <p:nvPr/>
-          </p:nvSpPr>
-          <p:spPr>
-            <a:xfrm>
-              <a:off x="7933265" y="3131105"/>
-              <a:ext cx="3369734" cy="1432397"/>
-            </a:xfrm>
-            <a:prstGeom prst="ellipse">
-              <a:avLst/>
-            </a:prstGeom>
-            <a:noFill/>
-            <a:ln>
-              <a:solidFill>
-                <a:schemeClr val="tx1"/>
-              </a:solidFill>
-            </a:ln>
-          </p:spPr>
-          <p:style>
-            <a:lnRef idx="1">
-              <a:schemeClr val="accent1"/>
-            </a:lnRef>
-            <a:fillRef idx="3">
-              <a:schemeClr val="accent1"/>
-            </a:fillRef>
-            <a:effectRef idx="2">
-              <a:schemeClr val="accent1"/>
-            </a:effectRef>
-            <a:fontRef idx="minor">
-              <a:schemeClr val="lt1"/>
-            </a:fontRef>
-          </p:style>
-          <p:txBody>
-            <a:bodyPr wrap="none" rtlCol="0" anchor="ctr">
-              <a:noAutofit/>
-            </a:bodyPr>
-            <a:lstStyle/>
-            <a:p>
-              <a:pPr lvl="0" algn="ctr"/>
-              <a:r>
-                <a:rPr lang="en-US" dirty="0" smtClean="0">
-                  <a:solidFill>
-                    <a:srgbClr val="FF0000"/>
-                  </a:solidFill>
-                  <a:latin typeface="Consolas" panose="020B0609020204030204" pitchFamily="49" charset="0"/>
-                </a:rPr>
-                <a:t>(5)</a:t>
-              </a:r>
-            </a:p>
-            <a:p>
-              <a:pPr lvl="0" algn="ctr"/>
-              <a:r>
-                <a:rPr lang="en-US" dirty="0" smtClean="0">
-                  <a:solidFill>
-                    <a:srgbClr val="FF0000"/>
-                  </a:solidFill>
-                  <a:latin typeface="Consolas" panose="020B0609020204030204" pitchFamily="49" charset="0"/>
-                </a:rPr>
-                <a:t>40: return</a:t>
-              </a:r>
-              <a:endParaRPr lang="en-US" dirty="0">
-                <a:solidFill>
-                  <a:srgbClr val="FF0000"/>
                 </a:solidFill>
                 <a:latin typeface="Consolas" panose="020B0609020204030204" pitchFamily="49" charset="0"/>
               </a:endParaRPr>
@@ -12179,8 +12090,8 @@
           </p:nvSpPr>
           <p:spPr>
             <a:xfrm>
-              <a:off x="3581398" y="5188531"/>
-              <a:ext cx="3369734" cy="1432397"/>
+              <a:off x="4032248" y="4926083"/>
+              <a:ext cx="3255436" cy="1542477"/>
             </a:xfrm>
             <a:prstGeom prst="ellipse">
               <a:avLst/>
@@ -12220,8 +12131,14 @@
                   </a:solidFill>
                   <a:latin typeface="Consolas" panose="020B0609020204030204" pitchFamily="49" charset="0"/>
                 </a:rPr>
-                <a:t>(6)</a:t>
+                <a:t>(5)</a:t>
               </a:r>
+              <a:endParaRPr lang="en-US" dirty="0" smtClean="0">
+                <a:solidFill>
+                  <a:schemeClr val="tx1"/>
+                </a:solidFill>
+                <a:latin typeface="Consolas" panose="020B0609020204030204" pitchFamily="49" charset="0"/>
+              </a:endParaRPr>
             </a:p>
             <a:p>
               <a:pPr lvl="0" algn="ctr"/>
@@ -12232,7 +12149,16 @@
                   </a:solidFill>
                   <a:latin typeface="Consolas" panose="020B0609020204030204" pitchFamily="49" charset="0"/>
                 </a:rPr>
-                <a:t>41: </a:t>
+                <a:t>34</a:t>
+              </a:r>
+              <a:r>
+                <a:rPr lang="en-US" dirty="0" smtClean="0">
+                  <a:solidFill>
+                    <a:schemeClr val="tx1"/>
+                  </a:solidFill>
+                  <a:latin typeface="Consolas" panose="020B0609020204030204" pitchFamily="49" charset="0"/>
+                </a:rPr>
+                <a:t>: </a:t>
               </a:r>
               <a:r>
                 <a:rPr lang="en-US" dirty="0" err="1" smtClean="0">
@@ -12262,7 +12188,16 @@
                   </a:solidFill>
                   <a:latin typeface="Consolas" panose="020B0609020204030204" pitchFamily="49" charset="0"/>
                 </a:rPr>
-                <a:t>44: </a:t>
+                <a:t>37</a:t>
+              </a:r>
+              <a:r>
+                <a:rPr lang="en-US" dirty="0" smtClean="0">
+                  <a:solidFill>
+                    <a:schemeClr val="tx1"/>
+                  </a:solidFill>
+                  <a:latin typeface="Consolas" panose="020B0609020204030204" pitchFamily="49" charset="0"/>
+                </a:rPr>
+                <a:t>: </a:t>
               </a:r>
               <a:r>
                 <a:rPr lang="en-US" dirty="0" err="1" smtClean="0">
@@ -12283,13 +12218,13 @@
                 <a:t> </a:t>
               </a:r>
               <a:r>
-                <a:rPr lang="en-US" dirty="0" smtClean="0">
+                <a:rPr lang="en-US" dirty="0">
                   <a:solidFill>
                     <a:schemeClr val="tx1"/>
                   </a:solidFill>
                   <a:latin typeface="Consolas" panose="020B0609020204030204" pitchFamily="49" charset="0"/>
                 </a:rPr>
-                <a:t>8</a:t>
+                <a:t>5</a:t>
               </a:r>
               <a:r>
                 <a:rPr lang="en-US" dirty="0" smtClean="0">
@@ -12313,15 +12248,15 @@
           <p:nvCxnSpPr>
             <p:cNvPr id="10" name="Straight Arrow Connector 9"/>
             <p:cNvCxnSpPr>
-              <a:stCxn id="4" idx="3"/>
+              <a:stCxn id="4" idx="2"/>
               <a:endCxn id="5" idx="0"/>
             </p:cNvCxnSpPr>
             <p:nvPr/>
           </p:nvCxnSpPr>
           <p:spPr>
             <a:xfrm flipH="1">
-              <a:off x="2743199" y="1348096"/>
-              <a:ext cx="1331685" cy="178589"/>
+              <a:off x="1784350" y="896708"/>
+              <a:ext cx="1790698" cy="659615"/>
             </a:xfrm>
             <a:prstGeom prst="straightConnector1">
               <a:avLst/>
@@ -12353,15 +12288,15 @@
           <p:nvCxnSpPr>
             <p:cNvPr id="11" name="Straight Arrow Connector 10"/>
             <p:cNvCxnSpPr>
-              <a:stCxn id="4" idx="5"/>
+              <a:stCxn id="4" idx="6"/>
               <a:endCxn id="6" idx="0"/>
             </p:cNvCxnSpPr>
             <p:nvPr/>
           </p:nvCxnSpPr>
           <p:spPr>
             <a:xfrm>
-              <a:off x="6457646" y="1348096"/>
-              <a:ext cx="1306285" cy="178589"/>
+              <a:off x="6830484" y="896708"/>
+              <a:ext cx="2120898" cy="659615"/>
             </a:xfrm>
             <a:prstGeom prst="straightConnector1">
               <a:avLst/>
@@ -12400,8 +12335,8 @@
           </p:nvCxnSpPr>
           <p:spPr>
             <a:xfrm>
-              <a:off x="2743199" y="2959082"/>
-              <a:ext cx="2523066" cy="2229449"/>
+              <a:off x="1784350" y="3098800"/>
+              <a:ext cx="3875616" cy="1827283"/>
             </a:xfrm>
             <a:prstGeom prst="straightConnector1">
               <a:avLst/>
@@ -12433,55 +12368,15 @@
           <p:nvCxnSpPr>
             <p:cNvPr id="13" name="Straight Arrow Connector 12"/>
             <p:cNvCxnSpPr>
-              <a:stCxn id="6" idx="3"/>
+              <a:stCxn id="6" idx="2"/>
               <a:endCxn id="7" idx="0"/>
             </p:cNvCxnSpPr>
             <p:nvPr/>
           </p:nvCxnSpPr>
           <p:spPr>
             <a:xfrm flipH="1">
-              <a:off x="5841998" y="2749312"/>
-              <a:ext cx="730552" cy="381793"/>
-            </a:xfrm>
-            <a:prstGeom prst="straightConnector1">
-              <a:avLst/>
-            </a:prstGeom>
-            <a:ln>
-              <a:solidFill>
-                <a:schemeClr val="tx1"/>
-              </a:solidFill>
-              <a:prstDash val="dash"/>
-              <a:tailEnd type="arrow"/>
-            </a:ln>
-          </p:spPr>
-          <p:style>
-            <a:lnRef idx="2">
-              <a:schemeClr val="accent1"/>
-            </a:lnRef>
-            <a:fillRef idx="0">
-              <a:schemeClr val="accent1"/>
-            </a:fillRef>
-            <a:effectRef idx="1">
-              <a:schemeClr val="accent1"/>
-            </a:effectRef>
-            <a:fontRef idx="minor">
-              <a:schemeClr val="tx1"/>
-            </a:fontRef>
-          </p:style>
-        </p:cxnSp>
-        <p:cxnSp>
-          <p:nvCxnSpPr>
-            <p:cNvPr id="14" name="Straight Arrow Connector 13"/>
-            <p:cNvCxnSpPr>
-              <a:stCxn id="6" idx="5"/>
-              <a:endCxn id="8" idx="0"/>
-            </p:cNvCxnSpPr>
-            <p:nvPr/>
-          </p:nvCxnSpPr>
-          <p:spPr>
-            <a:xfrm>
-              <a:off x="8955312" y="2749312"/>
-              <a:ext cx="662820" cy="381793"/>
+              <a:off x="6076949" y="2327562"/>
+              <a:ext cx="1246715" cy="456421"/>
             </a:xfrm>
             <a:prstGeom prst="straightConnector1">
               <a:avLst/>
@@ -12520,8 +12415,8 @@
           </p:nvCxnSpPr>
           <p:spPr>
             <a:xfrm flipH="1">
-              <a:off x="5266265" y="4563502"/>
-              <a:ext cx="575733" cy="625029"/>
+              <a:off x="5659966" y="4326460"/>
+              <a:ext cx="416983" cy="599623"/>
             </a:xfrm>
             <a:prstGeom prst="straightConnector1">
               <a:avLst/>
@@ -12551,20 +12446,23 @@
         </p:cxnSp>
         <p:cxnSp>
           <p:nvCxnSpPr>
-            <p:cNvPr id="16" name="Straight Arrow Connector 15"/>
+            <p:cNvPr id="57" name="Curved Connector 56"/>
             <p:cNvCxnSpPr>
-              <a:stCxn id="8" idx="4"/>
+              <a:stCxn id="6" idx="6"/>
               <a:endCxn id="9" idx="0"/>
             </p:cNvCxnSpPr>
             <p:nvPr/>
           </p:nvCxnSpPr>
           <p:spPr>
             <a:xfrm flipH="1">
-              <a:off x="5266265" y="4563502"/>
-              <a:ext cx="4351867" cy="625029"/>
+              <a:off x="5659966" y="2327562"/>
+              <a:ext cx="4919134" cy="2598521"/>
             </a:xfrm>
-            <a:prstGeom prst="straightConnector1">
-              <a:avLst/>
+            <a:prstGeom prst="curvedConnector4">
+              <a:avLst>
+                <a:gd name="adj1" fmla="val -258"/>
+                <a:gd name="adj2" fmla="val 80480"/>
+              </a:avLst>
             </a:prstGeom>
             <a:ln>
               <a:solidFill>
@@ -12858,7 +12756,7 @@
   <a:extraClrSchemeLst/>
   <a:extLst>
     <a:ext uri="{05A4C25C-085E-4340-85A3-A5531E510DB2}">
-      <thm15:themeFamily xmlns:thm15="http://schemas.microsoft.com/office/thememl/2012/main" xmlns="" name="Testing.potx" id="{A5FA5B82-E600-4A7E-8AE1-C06213944F22}" vid="{FF5EF395-F461-41AE-BF11-49871E4AB0B8}"/>
+      <thm15:themeFamily xmlns="" xmlns:thm15="http://schemas.microsoft.com/office/thememl/2012/main" name="Testing.potx" id="{A5FA5B82-E600-4A7E-8AE1-C06213944F22}" vid="{FF5EF395-F461-41AE-BF11-49871E4AB0B8}"/>
     </a:ext>
   </a:extLst>
 </a:theme>
@@ -13119,7 +13017,7 @@
   <a:extraClrSchemeLst/>
   <a:extLst>
     <a:ext uri="{05A4C25C-085E-4340-85A3-A5531E510DB2}">
-      <thm15:themeFamily xmlns:thm15="http://schemas.microsoft.com/office/thememl/2012/main" xmlns="" name="Office Theme" id="{62F939B6-93AF-4DB8-9C6B-D6C7DFDC589F}" vid="{4A3C46E8-61CC-4603-A589-7422A47A8E4A}"/>
+      <thm15:themeFamily xmlns="" xmlns:thm15="http://schemas.microsoft.com/office/thememl/2012/main" name="Office Theme" id="{62F939B6-93AF-4DB8-9C6B-D6C7DFDC589F}" vid="{4A3C46E8-61CC-4603-A589-7422A47A8E4A}"/>
     </a:ext>
   </a:extLst>
 </a:theme>

</xml_diff>